<commit_message>
implemented k-medoids algorithm recalculate hamming distance of k-means and k-medoids
</commit_message>
<xml_diff>
--- a/ClusteringPresentation.pptx
+++ b/ClusteringPresentation.pptx
@@ -10,19 +10,17 @@
     <p:sldMasterId id="2147483820" r:id="rId6"/>
   </p:sldMasterIdLst>
   <p:notesMasterIdLst>
-    <p:notesMasterId r:id="rId17"/>
+    <p:notesMasterId r:id="rId15"/>
   </p:notesMasterIdLst>
   <p:sldIdLst>
     <p:sldId id="256" r:id="rId7"/>
     <p:sldId id="257" r:id="rId8"/>
     <p:sldId id="258" r:id="rId9"/>
-    <p:sldId id="259" r:id="rId10"/>
-    <p:sldId id="262" r:id="rId11"/>
-    <p:sldId id="263" r:id="rId12"/>
-    <p:sldId id="265" r:id="rId13"/>
-    <p:sldId id="267" r:id="rId14"/>
-    <p:sldId id="264" r:id="rId15"/>
-    <p:sldId id="261" r:id="rId16"/>
+    <p:sldId id="268" r:id="rId10"/>
+    <p:sldId id="269" r:id="rId11"/>
+    <p:sldId id="259" r:id="rId12"/>
+    <p:sldId id="264" r:id="rId13"/>
+    <p:sldId id="261" r:id="rId14"/>
   </p:sldIdLst>
   <p:sldSz cx="12192000" cy="6858000"/>
   <p:notesSz cx="6858000" cy="9144000"/>
@@ -211,7 +209,7 @@
           <a:p>
             <a:fld id="{415376F5-8A5D-4C4F-853A-CD59C039DA6C}" type="datetimeFigureOut">
               <a:rPr lang="en-US" smtClean="0"/>
-              <a:t>3/2/2018</a:t>
+              <a:t>3/12/2018</a:t>
             </a:fld>
             <a:endParaRPr lang="en-US"/>
           </a:p>
@@ -705,7 +703,7 @@
           <a:p>
             <a:fld id="{61ADADD4-51CF-4058-85FB-AE1EAB715BFD}" type="datetimeFigureOut">
               <a:rPr lang="en-US" smtClean="0"/>
-              <a:t>3/2/2018</a:t>
+              <a:t>3/12/2018</a:t>
             </a:fld>
             <a:endParaRPr lang="en-US"/>
           </a:p>
@@ -875,7 +873,7 @@
           <a:p>
             <a:fld id="{61ADADD4-51CF-4058-85FB-AE1EAB715BFD}" type="datetimeFigureOut">
               <a:rPr lang="en-US" smtClean="0"/>
-              <a:t>3/2/2018</a:t>
+              <a:t>3/12/2018</a:t>
             </a:fld>
             <a:endParaRPr lang="en-US"/>
           </a:p>
@@ -1055,7 +1053,7 @@
           <a:p>
             <a:fld id="{61ADADD4-51CF-4058-85FB-AE1EAB715BFD}" type="datetimeFigureOut">
               <a:rPr lang="en-US" smtClean="0"/>
-              <a:t>3/2/2018</a:t>
+              <a:t>3/12/2018</a:t>
             </a:fld>
             <a:endParaRPr lang="en-US"/>
           </a:p>
@@ -1258,7 +1256,7 @@
           <a:p>
             <a:fld id="{61ADADD4-51CF-4058-85FB-AE1EAB715BFD}" type="datetimeFigureOut">
               <a:rPr lang="en-US" smtClean="0"/>
-              <a:t>3/2/2018</a:t>
+              <a:t>3/12/2018</a:t>
             </a:fld>
             <a:endParaRPr lang="en-US"/>
           </a:p>
@@ -1428,7 +1426,7 @@
           <a:p>
             <a:fld id="{61ADADD4-51CF-4058-85FB-AE1EAB715BFD}" type="datetimeFigureOut">
               <a:rPr lang="en-US" smtClean="0"/>
-              <a:t>3/2/2018</a:t>
+              <a:t>3/12/2018</a:t>
             </a:fld>
             <a:endParaRPr lang="en-US"/>
           </a:p>
@@ -1679,7 +1677,7 @@
           <a:p>
             <a:fld id="{61ADADD4-51CF-4058-85FB-AE1EAB715BFD}" type="datetimeFigureOut">
               <a:rPr lang="en-US" smtClean="0"/>
-              <a:t>3/2/2018</a:t>
+              <a:t>3/12/2018</a:t>
             </a:fld>
             <a:endParaRPr lang="en-US"/>
           </a:p>
@@ -1911,7 +1909,7 @@
           <a:p>
             <a:fld id="{61ADADD4-51CF-4058-85FB-AE1EAB715BFD}" type="datetimeFigureOut">
               <a:rPr lang="en-US" smtClean="0"/>
-              <a:t>3/2/2018</a:t>
+              <a:t>3/12/2018</a:t>
             </a:fld>
             <a:endParaRPr lang="en-US"/>
           </a:p>
@@ -2258,7 +2256,7 @@
           <a:p>
             <a:fld id="{61ADADD4-51CF-4058-85FB-AE1EAB715BFD}" type="datetimeFigureOut">
               <a:rPr lang="en-US" smtClean="0"/>
-              <a:t>3/2/2018</a:t>
+              <a:t>3/12/2018</a:t>
             </a:fld>
             <a:endParaRPr lang="en-US"/>
           </a:p>
@@ -2376,7 +2374,7 @@
           <a:p>
             <a:fld id="{61ADADD4-51CF-4058-85FB-AE1EAB715BFD}" type="datetimeFigureOut">
               <a:rPr lang="en-US" smtClean="0"/>
-              <a:t>3/2/2018</a:t>
+              <a:t>3/12/2018</a:t>
             </a:fld>
             <a:endParaRPr lang="en-US"/>
           </a:p>
@@ -2494,7 +2492,7 @@
           <a:p>
             <a:fld id="{61ADADD4-51CF-4058-85FB-AE1EAB715BFD}" type="datetimeFigureOut">
               <a:rPr lang="en-US" smtClean="0"/>
-              <a:t>3/2/2018</a:t>
+              <a:t>3/12/2018</a:t>
             </a:fld>
             <a:endParaRPr lang="en-US"/>
           </a:p>
@@ -2778,7 +2776,7 @@
           <a:p>
             <a:fld id="{61ADADD4-51CF-4058-85FB-AE1EAB715BFD}" type="datetimeFigureOut">
               <a:rPr lang="en-US" smtClean="0"/>
-              <a:t>3/2/2018</a:t>
+              <a:t>3/12/2018</a:t>
             </a:fld>
             <a:endParaRPr lang="en-US"/>
           </a:p>
@@ -2948,7 +2946,7 @@
           <a:p>
             <a:fld id="{61ADADD4-51CF-4058-85FB-AE1EAB715BFD}" type="datetimeFigureOut">
               <a:rPr lang="en-US" smtClean="0"/>
-              <a:t>3/2/2018</a:t>
+              <a:t>3/12/2018</a:t>
             </a:fld>
             <a:endParaRPr lang="en-US"/>
           </a:p>
@@ -3212,7 +3210,7 @@
           <a:p>
             <a:fld id="{61ADADD4-51CF-4058-85FB-AE1EAB715BFD}" type="datetimeFigureOut">
               <a:rPr lang="en-US" smtClean="0"/>
-              <a:t>3/2/2018</a:t>
+              <a:t>3/12/2018</a:t>
             </a:fld>
             <a:endParaRPr lang="en-US"/>
           </a:p>
@@ -3382,7 +3380,7 @@
           <a:p>
             <a:fld id="{61ADADD4-51CF-4058-85FB-AE1EAB715BFD}" type="datetimeFigureOut">
               <a:rPr lang="en-US" smtClean="0"/>
-              <a:t>3/2/2018</a:t>
+              <a:t>3/12/2018</a:t>
             </a:fld>
             <a:endParaRPr lang="en-US"/>
           </a:p>
@@ -3562,7 +3560,7 @@
           <a:p>
             <a:fld id="{61ADADD4-51CF-4058-85FB-AE1EAB715BFD}" type="datetimeFigureOut">
               <a:rPr lang="en-US" smtClean="0"/>
-              <a:t>3/2/2018</a:t>
+              <a:t>3/12/2018</a:t>
             </a:fld>
             <a:endParaRPr lang="en-US"/>
           </a:p>
@@ -3765,7 +3763,7 @@
           <a:p>
             <a:fld id="{61ADADD4-51CF-4058-85FB-AE1EAB715BFD}" type="datetimeFigureOut">
               <a:rPr lang="en-US" smtClean="0"/>
-              <a:t>3/2/2018</a:t>
+              <a:t>3/12/2018</a:t>
             </a:fld>
             <a:endParaRPr lang="en-US"/>
           </a:p>
@@ -3935,7 +3933,7 @@
           <a:p>
             <a:fld id="{61ADADD4-51CF-4058-85FB-AE1EAB715BFD}" type="datetimeFigureOut">
               <a:rPr lang="en-US" smtClean="0"/>
-              <a:t>3/2/2018</a:t>
+              <a:t>3/12/2018</a:t>
             </a:fld>
             <a:endParaRPr lang="en-US"/>
           </a:p>
@@ -4186,7 +4184,7 @@
           <a:p>
             <a:fld id="{61ADADD4-51CF-4058-85FB-AE1EAB715BFD}" type="datetimeFigureOut">
               <a:rPr lang="en-US" smtClean="0"/>
-              <a:t>3/2/2018</a:t>
+              <a:t>3/12/2018</a:t>
             </a:fld>
             <a:endParaRPr lang="en-US"/>
           </a:p>
@@ -4418,7 +4416,7 @@
           <a:p>
             <a:fld id="{61ADADD4-51CF-4058-85FB-AE1EAB715BFD}" type="datetimeFigureOut">
               <a:rPr lang="en-US" smtClean="0"/>
-              <a:t>3/2/2018</a:t>
+              <a:t>3/12/2018</a:t>
             </a:fld>
             <a:endParaRPr lang="en-US"/>
           </a:p>
@@ -4765,7 +4763,7 @@
           <a:p>
             <a:fld id="{61ADADD4-51CF-4058-85FB-AE1EAB715BFD}" type="datetimeFigureOut">
               <a:rPr lang="en-US" smtClean="0"/>
-              <a:t>3/2/2018</a:t>
+              <a:t>3/12/2018</a:t>
             </a:fld>
             <a:endParaRPr lang="en-US"/>
           </a:p>
@@ -4883,7 +4881,7 @@
           <a:p>
             <a:fld id="{61ADADD4-51CF-4058-85FB-AE1EAB715BFD}" type="datetimeFigureOut">
               <a:rPr lang="en-US" smtClean="0"/>
-              <a:t>3/2/2018</a:t>
+              <a:t>3/12/2018</a:t>
             </a:fld>
             <a:endParaRPr lang="en-US"/>
           </a:p>
@@ -5001,7 +4999,7 @@
           <a:p>
             <a:fld id="{61ADADD4-51CF-4058-85FB-AE1EAB715BFD}" type="datetimeFigureOut">
               <a:rPr lang="en-US" smtClean="0"/>
-              <a:t>3/2/2018</a:t>
+              <a:t>3/12/2018</a:t>
             </a:fld>
             <a:endParaRPr lang="en-US"/>
           </a:p>
@@ -5252,7 +5250,7 @@
           <a:p>
             <a:fld id="{61ADADD4-51CF-4058-85FB-AE1EAB715BFD}" type="datetimeFigureOut">
               <a:rPr lang="en-US" smtClean="0"/>
-              <a:t>3/2/2018</a:t>
+              <a:t>3/12/2018</a:t>
             </a:fld>
             <a:endParaRPr lang="en-US"/>
           </a:p>
@@ -5536,7 +5534,7 @@
           <a:p>
             <a:fld id="{61ADADD4-51CF-4058-85FB-AE1EAB715BFD}" type="datetimeFigureOut">
               <a:rPr lang="en-US" smtClean="0"/>
-              <a:t>3/2/2018</a:t>
+              <a:t>3/12/2018</a:t>
             </a:fld>
             <a:endParaRPr lang="en-US"/>
           </a:p>
@@ -5800,7 +5798,7 @@
           <a:p>
             <a:fld id="{61ADADD4-51CF-4058-85FB-AE1EAB715BFD}" type="datetimeFigureOut">
               <a:rPr lang="en-US" smtClean="0"/>
-              <a:t>3/2/2018</a:t>
+              <a:t>3/12/2018</a:t>
             </a:fld>
             <a:endParaRPr lang="en-US"/>
           </a:p>
@@ -5970,7 +5968,7 @@
           <a:p>
             <a:fld id="{61ADADD4-51CF-4058-85FB-AE1EAB715BFD}" type="datetimeFigureOut">
               <a:rPr lang="en-US" smtClean="0"/>
-              <a:t>3/2/2018</a:t>
+              <a:t>3/12/2018</a:t>
             </a:fld>
             <a:endParaRPr lang="en-US"/>
           </a:p>
@@ -6150,7 +6148,7 @@
           <a:p>
             <a:fld id="{61ADADD4-51CF-4058-85FB-AE1EAB715BFD}" type="datetimeFigureOut">
               <a:rPr lang="en-US" smtClean="0"/>
-              <a:t>3/2/2018</a:t>
+              <a:t>3/12/2018</a:t>
             </a:fld>
             <a:endParaRPr lang="en-US"/>
           </a:p>
@@ -6353,7 +6351,7 @@
           <a:p>
             <a:fld id="{61ADADD4-51CF-4058-85FB-AE1EAB715BFD}" type="datetimeFigureOut">
               <a:rPr lang="en-US" smtClean="0"/>
-              <a:t>3/2/2018</a:t>
+              <a:t>3/12/2018</a:t>
             </a:fld>
             <a:endParaRPr lang="en-US"/>
           </a:p>
@@ -6523,7 +6521,7 @@
           <a:p>
             <a:fld id="{61ADADD4-51CF-4058-85FB-AE1EAB715BFD}" type="datetimeFigureOut">
               <a:rPr lang="en-US" smtClean="0"/>
-              <a:t>3/2/2018</a:t>
+              <a:t>3/12/2018</a:t>
             </a:fld>
             <a:endParaRPr lang="en-US"/>
           </a:p>
@@ -6774,7 +6772,7 @@
           <a:p>
             <a:fld id="{61ADADD4-51CF-4058-85FB-AE1EAB715BFD}" type="datetimeFigureOut">
               <a:rPr lang="en-US" smtClean="0"/>
-              <a:t>3/2/2018</a:t>
+              <a:t>3/12/2018</a:t>
             </a:fld>
             <a:endParaRPr lang="en-US"/>
           </a:p>
@@ -7006,7 +7004,7 @@
           <a:p>
             <a:fld id="{61ADADD4-51CF-4058-85FB-AE1EAB715BFD}" type="datetimeFigureOut">
               <a:rPr lang="en-US" smtClean="0"/>
-              <a:t>3/2/2018</a:t>
+              <a:t>3/12/2018</a:t>
             </a:fld>
             <a:endParaRPr lang="en-US"/>
           </a:p>
@@ -7353,7 +7351,7 @@
           <a:p>
             <a:fld id="{61ADADD4-51CF-4058-85FB-AE1EAB715BFD}" type="datetimeFigureOut">
               <a:rPr lang="en-US" smtClean="0"/>
-              <a:t>3/2/2018</a:t>
+              <a:t>3/12/2018</a:t>
             </a:fld>
             <a:endParaRPr lang="en-US"/>
           </a:p>
@@ -7471,7 +7469,7 @@
           <a:p>
             <a:fld id="{61ADADD4-51CF-4058-85FB-AE1EAB715BFD}" type="datetimeFigureOut">
               <a:rPr lang="en-US" smtClean="0"/>
-              <a:t>3/2/2018</a:t>
+              <a:t>3/12/2018</a:t>
             </a:fld>
             <a:endParaRPr lang="en-US"/>
           </a:p>
@@ -7726,7 +7724,7 @@
           <a:p>
             <a:fld id="{61ADADD4-51CF-4058-85FB-AE1EAB715BFD}" type="datetimeFigureOut">
               <a:rPr lang="en-US" smtClean="0"/>
-              <a:t>3/2/2018</a:t>
+              <a:t>3/12/2018</a:t>
             </a:fld>
             <a:endParaRPr lang="en-US"/>
           </a:p>
@@ -7821,7 +7819,7 @@
           <a:p>
             <a:fld id="{61ADADD4-51CF-4058-85FB-AE1EAB715BFD}" type="datetimeFigureOut">
               <a:rPr lang="en-US" smtClean="0"/>
-              <a:t>3/2/2018</a:t>
+              <a:t>3/12/2018</a:t>
             </a:fld>
             <a:endParaRPr lang="en-US"/>
           </a:p>
@@ -8105,7 +8103,7 @@
           <a:p>
             <a:fld id="{61ADADD4-51CF-4058-85FB-AE1EAB715BFD}" type="datetimeFigureOut">
               <a:rPr lang="en-US" smtClean="0"/>
-              <a:t>3/2/2018</a:t>
+              <a:t>3/12/2018</a:t>
             </a:fld>
             <a:endParaRPr lang="en-US"/>
           </a:p>
@@ -8369,7 +8367,7 @@
           <a:p>
             <a:fld id="{61ADADD4-51CF-4058-85FB-AE1EAB715BFD}" type="datetimeFigureOut">
               <a:rPr lang="en-US" smtClean="0"/>
-              <a:t>3/2/2018</a:t>
+              <a:t>3/12/2018</a:t>
             </a:fld>
             <a:endParaRPr lang="en-US"/>
           </a:p>
@@ -8539,7 +8537,7 @@
           <a:p>
             <a:fld id="{61ADADD4-51CF-4058-85FB-AE1EAB715BFD}" type="datetimeFigureOut">
               <a:rPr lang="en-US" smtClean="0"/>
-              <a:t>3/2/2018</a:t>
+              <a:t>3/12/2018</a:t>
             </a:fld>
             <a:endParaRPr lang="en-US"/>
           </a:p>
@@ -8719,7 +8717,7 @@
           <a:p>
             <a:fld id="{61ADADD4-51CF-4058-85FB-AE1EAB715BFD}" type="datetimeFigureOut">
               <a:rPr lang="en-US" smtClean="0"/>
-              <a:t>3/2/2018</a:t>
+              <a:t>3/12/2018</a:t>
             </a:fld>
             <a:endParaRPr lang="en-US"/>
           </a:p>
@@ -8922,7 +8920,7 @@
           <a:p>
             <a:fld id="{61ADADD4-51CF-4058-85FB-AE1EAB715BFD}" type="datetimeFigureOut">
               <a:rPr lang="en-US" smtClean="0"/>
-              <a:t>3/2/2018</a:t>
+              <a:t>3/12/2018</a:t>
             </a:fld>
             <a:endParaRPr lang="en-US"/>
           </a:p>
@@ -9092,7 +9090,7 @@
           <a:p>
             <a:fld id="{61ADADD4-51CF-4058-85FB-AE1EAB715BFD}" type="datetimeFigureOut">
               <a:rPr lang="en-US" smtClean="0"/>
-              <a:t>3/2/2018</a:t>
+              <a:t>3/12/2018</a:t>
             </a:fld>
             <a:endParaRPr lang="en-US"/>
           </a:p>
@@ -9343,7 +9341,7 @@
           <a:p>
             <a:fld id="{61ADADD4-51CF-4058-85FB-AE1EAB715BFD}" type="datetimeFigureOut">
               <a:rPr lang="en-US" smtClean="0"/>
-              <a:t>3/2/2018</a:t>
+              <a:t>3/12/2018</a:t>
             </a:fld>
             <a:endParaRPr lang="en-US"/>
           </a:p>
@@ -9575,7 +9573,7 @@
           <a:p>
             <a:fld id="{61ADADD4-51CF-4058-85FB-AE1EAB715BFD}" type="datetimeFigureOut">
               <a:rPr lang="en-US" smtClean="0"/>
-              <a:t>3/2/2018</a:t>
+              <a:t>3/12/2018</a:t>
             </a:fld>
             <a:endParaRPr lang="en-US"/>
           </a:p>
@@ -9922,7 +9920,7 @@
           <a:p>
             <a:fld id="{61ADADD4-51CF-4058-85FB-AE1EAB715BFD}" type="datetimeFigureOut">
               <a:rPr lang="en-US" smtClean="0"/>
-              <a:t>3/2/2018</a:t>
+              <a:t>3/12/2018</a:t>
             </a:fld>
             <a:endParaRPr lang="en-US"/>
           </a:p>
@@ -10292,7 +10290,7 @@
           <a:p>
             <a:fld id="{61ADADD4-51CF-4058-85FB-AE1EAB715BFD}" type="datetimeFigureOut">
               <a:rPr lang="en-US" smtClean="0"/>
-              <a:t>3/2/2018</a:t>
+              <a:t>3/12/2018</a:t>
             </a:fld>
             <a:endParaRPr lang="en-US"/>
           </a:p>
@@ -10410,7 +10408,7 @@
           <a:p>
             <a:fld id="{61ADADD4-51CF-4058-85FB-AE1EAB715BFD}" type="datetimeFigureOut">
               <a:rPr lang="en-US" smtClean="0"/>
-              <a:t>3/2/2018</a:t>
+              <a:t>3/12/2018</a:t>
             </a:fld>
             <a:endParaRPr lang="en-US"/>
           </a:p>
@@ -10528,7 +10526,7 @@
           <a:p>
             <a:fld id="{61ADADD4-51CF-4058-85FB-AE1EAB715BFD}" type="datetimeFigureOut">
               <a:rPr lang="en-US" smtClean="0"/>
-              <a:t>3/2/2018</a:t>
+              <a:t>3/12/2018</a:t>
             </a:fld>
             <a:endParaRPr lang="en-US"/>
           </a:p>
@@ -10812,7 +10810,7 @@
           <a:p>
             <a:fld id="{61ADADD4-51CF-4058-85FB-AE1EAB715BFD}" type="datetimeFigureOut">
               <a:rPr lang="en-US" smtClean="0"/>
-              <a:t>3/2/2018</a:t>
+              <a:t>3/12/2018</a:t>
             </a:fld>
             <a:endParaRPr lang="en-US"/>
           </a:p>
@@ -11076,7 +11074,7 @@
           <a:p>
             <a:fld id="{61ADADD4-51CF-4058-85FB-AE1EAB715BFD}" type="datetimeFigureOut">
               <a:rPr lang="en-US" smtClean="0"/>
-              <a:t>3/2/2018</a:t>
+              <a:t>3/12/2018</a:t>
             </a:fld>
             <a:endParaRPr lang="en-US"/>
           </a:p>
@@ -11246,7 +11244,7 @@
           <a:p>
             <a:fld id="{61ADADD4-51CF-4058-85FB-AE1EAB715BFD}" type="datetimeFigureOut">
               <a:rPr lang="en-US" smtClean="0"/>
-              <a:t>3/2/2018</a:t>
+              <a:t>3/12/2018</a:t>
             </a:fld>
             <a:endParaRPr lang="en-US"/>
           </a:p>
@@ -11426,7 +11424,7 @@
           <a:p>
             <a:fld id="{61ADADD4-51CF-4058-85FB-AE1EAB715BFD}" type="datetimeFigureOut">
               <a:rPr lang="en-US" smtClean="0"/>
-              <a:t>3/2/2018</a:t>
+              <a:t>3/12/2018</a:t>
             </a:fld>
             <a:endParaRPr lang="en-US"/>
           </a:p>
@@ -11713,7 +11711,7 @@
           <a:p>
             <a:fld id="{61ADADD4-51CF-4058-85FB-AE1EAB715BFD}" type="datetimeFigureOut">
               <a:rPr lang="en-US" smtClean="0"/>
-              <a:t>3/2/2018</a:t>
+              <a:t>3/12/2018</a:t>
             </a:fld>
             <a:endParaRPr lang="en-US"/>
           </a:p>
@@ -11925,7 +11923,7 @@
           <a:p>
             <a:fld id="{61ADADD4-51CF-4058-85FB-AE1EAB715BFD}" type="datetimeFigureOut">
               <a:rPr lang="en-US" smtClean="0"/>
-              <a:t>3/2/2018</a:t>
+              <a:t>3/12/2018</a:t>
             </a:fld>
             <a:endParaRPr lang="en-US"/>
           </a:p>
@@ -12268,7 +12266,7 @@
           <a:p>
             <a:fld id="{61ADADD4-51CF-4058-85FB-AE1EAB715BFD}" type="datetimeFigureOut">
               <a:rPr lang="en-US" smtClean="0"/>
-              <a:t>3/2/2018</a:t>
+              <a:t>3/12/2018</a:t>
             </a:fld>
             <a:endParaRPr lang="en-US"/>
           </a:p>
@@ -12543,7 +12541,7 @@
           <a:p>
             <a:fld id="{61ADADD4-51CF-4058-85FB-AE1EAB715BFD}" type="datetimeFigureOut">
               <a:rPr lang="en-US" smtClean="0"/>
-              <a:t>3/2/2018</a:t>
+              <a:t>3/12/2018</a:t>
             </a:fld>
             <a:endParaRPr lang="en-US"/>
           </a:p>
@@ -12638,7 +12636,7 @@
           <a:p>
             <a:fld id="{61ADADD4-51CF-4058-85FB-AE1EAB715BFD}" type="datetimeFigureOut">
               <a:rPr lang="en-US" smtClean="0"/>
-              <a:t>3/2/2018</a:t>
+              <a:t>3/12/2018</a:t>
             </a:fld>
             <a:endParaRPr lang="en-US"/>
           </a:p>
@@ -13040,7 +13038,7 @@
           <a:p>
             <a:fld id="{61ADADD4-51CF-4058-85FB-AE1EAB715BFD}" type="datetimeFigureOut">
               <a:rPr lang="en-US" smtClean="0"/>
-              <a:t>3/2/2018</a:t>
+              <a:t>3/12/2018</a:t>
             </a:fld>
             <a:endParaRPr lang="en-US"/>
           </a:p>
@@ -13158,7 +13156,7 @@
           <a:p>
             <a:fld id="{61ADADD4-51CF-4058-85FB-AE1EAB715BFD}" type="datetimeFigureOut">
               <a:rPr lang="en-US" smtClean="0"/>
-              <a:t>3/2/2018</a:t>
+              <a:t>3/12/2018</a:t>
             </a:fld>
             <a:endParaRPr lang="en-US"/>
           </a:p>
@@ -13329,7 +13327,7 @@
           <a:p>
             <a:fld id="{61ADADD4-51CF-4058-85FB-AE1EAB715BFD}" type="datetimeFigureOut">
               <a:rPr lang="en-US" smtClean="0"/>
-              <a:t>3/2/2018</a:t>
+              <a:t>3/12/2018</a:t>
             </a:fld>
             <a:endParaRPr lang="en-US"/>
           </a:p>
@@ -13683,7 +13681,7 @@
           <a:p>
             <a:fld id="{61ADADD4-51CF-4058-85FB-AE1EAB715BFD}" type="datetimeFigureOut">
               <a:rPr lang="en-US" smtClean="0"/>
-              <a:t>3/2/2018</a:t>
+              <a:t>3/12/2018</a:t>
             </a:fld>
             <a:endParaRPr lang="en-US"/>
           </a:p>
@@ -14065,7 +14063,7 @@
           <a:p>
             <a:fld id="{61ADADD4-51CF-4058-85FB-AE1EAB715BFD}" type="datetimeFigureOut">
               <a:rPr lang="en-US" smtClean="0"/>
-              <a:t>3/2/2018</a:t>
+              <a:t>3/12/2018</a:t>
             </a:fld>
             <a:endParaRPr lang="en-US"/>
           </a:p>
@@ -14235,7 +14233,7 @@
           <a:p>
             <a:fld id="{61ADADD4-51CF-4058-85FB-AE1EAB715BFD}" type="datetimeFigureOut">
               <a:rPr lang="en-US" smtClean="0"/>
-              <a:t>3/2/2018</a:t>
+              <a:t>3/12/2018</a:t>
             </a:fld>
             <a:endParaRPr lang="en-US"/>
           </a:p>
@@ -14491,7 +14489,7 @@
           <a:p>
             <a:fld id="{61ADADD4-51CF-4058-85FB-AE1EAB715BFD}" type="datetimeFigureOut">
               <a:rPr lang="en-US" smtClean="0"/>
-              <a:t>3/2/2018</a:t>
+              <a:t>3/12/2018</a:t>
             </a:fld>
             <a:endParaRPr lang="en-US"/>
           </a:p>
@@ -14586,7 +14584,7 @@
           <a:p>
             <a:fld id="{61ADADD4-51CF-4058-85FB-AE1EAB715BFD}" type="datetimeFigureOut">
               <a:rPr lang="en-US" smtClean="0"/>
-              <a:t>3/2/2018</a:t>
+              <a:t>3/12/2018</a:t>
             </a:fld>
             <a:endParaRPr lang="en-US"/>
           </a:p>
@@ -14870,7 +14868,7 @@
           <a:p>
             <a:fld id="{61ADADD4-51CF-4058-85FB-AE1EAB715BFD}" type="datetimeFigureOut">
               <a:rPr lang="en-US" smtClean="0"/>
-              <a:t>3/2/2018</a:t>
+              <a:t>3/12/2018</a:t>
             </a:fld>
             <a:endParaRPr lang="en-US"/>
           </a:p>
@@ -15134,7 +15132,7 @@
           <a:p>
             <a:fld id="{61ADADD4-51CF-4058-85FB-AE1EAB715BFD}" type="datetimeFigureOut">
               <a:rPr lang="en-US" smtClean="0"/>
-              <a:t>3/2/2018</a:t>
+              <a:t>3/12/2018</a:t>
             </a:fld>
             <a:endParaRPr lang="en-US"/>
           </a:p>
@@ -15348,7 +15346,7 @@
           <a:p>
             <a:fld id="{61ADADD4-51CF-4058-85FB-AE1EAB715BFD}" type="datetimeFigureOut">
               <a:rPr lang="en-US" smtClean="0"/>
-              <a:t>3/2/2018</a:t>
+              <a:t>3/12/2018</a:t>
             </a:fld>
             <a:endParaRPr lang="en-US"/>
           </a:p>
@@ -15878,7 +15876,7 @@
           <a:p>
             <a:fld id="{61ADADD4-51CF-4058-85FB-AE1EAB715BFD}" type="datetimeFigureOut">
               <a:rPr lang="en-US" smtClean="0"/>
-              <a:t>3/2/2018</a:t>
+              <a:t>3/12/2018</a:t>
             </a:fld>
             <a:endParaRPr lang="en-US"/>
           </a:p>
@@ -16408,7 +16406,7 @@
           <a:p>
             <a:fld id="{61ADADD4-51CF-4058-85FB-AE1EAB715BFD}" type="datetimeFigureOut">
               <a:rPr lang="en-US" smtClean="0"/>
-              <a:t>3/2/2018</a:t>
+              <a:t>3/12/2018</a:t>
             </a:fld>
             <a:endParaRPr lang="en-US"/>
           </a:p>
@@ -16938,7 +16936,7 @@
           <a:p>
             <a:fld id="{61ADADD4-51CF-4058-85FB-AE1EAB715BFD}" type="datetimeFigureOut">
               <a:rPr lang="en-US" smtClean="0"/>
-              <a:t>3/2/2018</a:t>
+              <a:t>3/12/2018</a:t>
             </a:fld>
             <a:endParaRPr lang="en-US"/>
           </a:p>
@@ -17468,7 +17466,7 @@
           <a:p>
             <a:fld id="{61ADADD4-51CF-4058-85FB-AE1EAB715BFD}" type="datetimeFigureOut">
               <a:rPr lang="en-US" smtClean="0"/>
-              <a:t>3/2/2018</a:t>
+              <a:t>3/12/2018</a:t>
             </a:fld>
             <a:endParaRPr lang="en-US"/>
           </a:p>
@@ -18071,7 +18069,7 @@
           <a:p>
             <a:fld id="{61ADADD4-51CF-4058-85FB-AE1EAB715BFD}" type="datetimeFigureOut">
               <a:rPr lang="en-US" smtClean="0"/>
-              <a:t>3/2/2018</a:t>
+              <a:t>3/12/2018</a:t>
             </a:fld>
             <a:endParaRPr lang="en-US"/>
           </a:p>
@@ -18660,15 +18658,7 @@
           <a:p>
             <a:r>
               <a:rPr lang="en-US" altLang="zh-CN" dirty="0" smtClean="0"/>
-              <a:t>Date: </a:t>
-            </a:r>
-            <a:r>
-              <a:rPr lang="en-US" altLang="zh-CN" dirty="0" smtClean="0"/>
-              <a:t>Mar</a:t>
-            </a:r>
-            <a:r>
-              <a:rPr lang="en-US" altLang="zh-CN" dirty="0" smtClean="0"/>
-              <a:t>. </a:t>
+              <a:t>Date: Mar. </a:t>
             </a:r>
             <a:r>
               <a:rPr lang="en-US" altLang="zh-CN" dirty="0"/>
@@ -18676,11 +18666,7 @@
             </a:r>
             <a:r>
               <a:rPr lang="en-US" altLang="zh-CN" dirty="0" smtClean="0"/>
-              <a:t>, </a:t>
-            </a:r>
-            <a:r>
-              <a:rPr lang="en-US" altLang="zh-CN" dirty="0" smtClean="0"/>
-              <a:t>2018</a:t>
+              <a:t>, 2018</a:t>
             </a:r>
           </a:p>
         </p:txBody>
@@ -18689,72 +18675,6 @@
     <p:extLst>
       <p:ext uri="{BB962C8B-B14F-4D97-AF65-F5344CB8AC3E}">
         <p14:creationId xmlns:p14="http://schemas.microsoft.com/office/powerpoint/2010/main" val="3381172924"/>
-      </p:ext>
-    </p:extLst>
-  </p:cSld>
-  <p:clrMapOvr>
-    <a:masterClrMapping/>
-  </p:clrMapOvr>
-  <p:timing>
-    <p:tnLst>
-      <p:par>
-        <p:cTn id="1" dur="indefinite" restart="never" nodeType="tmRoot"/>
-      </p:par>
-    </p:tnLst>
-  </p:timing>
-</p:sld>
-</file>
-
-<file path=ppt/slides/slide10.xml><?xml version="1.0" encoding="utf-8"?>
-<p:sld xmlns:a="http://schemas.openxmlformats.org/drawingml/2006/main" xmlns:r="http://schemas.openxmlformats.org/officeDocument/2006/relationships" xmlns:p="http://schemas.openxmlformats.org/presentationml/2006/main">
-  <p:cSld>
-    <p:spTree>
-      <p:nvGrpSpPr>
-        <p:cNvPr id="1" name=""/>
-        <p:cNvGrpSpPr/>
-        <p:nvPr/>
-      </p:nvGrpSpPr>
-      <p:grpSpPr>
-        <a:xfrm>
-          <a:off x="0" y="0"/>
-          <a:ext cx="0" cy="0"/>
-          <a:chOff x="0" y="0"/>
-          <a:chExt cx="0" cy="0"/>
-        </a:xfrm>
-      </p:grpSpPr>
-      <p:sp>
-        <p:nvSpPr>
-          <p:cNvPr id="2" name="标题 1"/>
-          <p:cNvSpPr>
-            <a:spLocks noGrp="1"/>
-          </p:cNvSpPr>
-          <p:nvPr>
-            <p:ph type="title"/>
-          </p:nvPr>
-        </p:nvSpPr>
-        <p:spPr>
-          <a:xfrm>
-            <a:off x="1174917" y="2141282"/>
-            <a:ext cx="10058400" cy="1450757"/>
-          </a:xfrm>
-        </p:spPr>
-        <p:txBody>
-          <a:bodyPr/>
-          <a:lstStyle/>
-          <a:p>
-            <a:pPr algn="ctr"/>
-            <a:r>
-              <a:rPr lang="en-US" dirty="0" smtClean="0"/>
-              <a:t>Thank you!</a:t>
-            </a:r>
-            <a:endParaRPr lang="en-US" dirty="0"/>
-          </a:p>
-        </p:txBody>
-      </p:sp>
-    </p:spTree>
-    <p:extLst>
-      <p:ext uri="{BB962C8B-B14F-4D97-AF65-F5344CB8AC3E}">
-        <p14:creationId xmlns:p14="http://schemas.microsoft.com/office/powerpoint/2010/main" val="2297984777"/>
       </p:ext>
     </p:extLst>
   </p:cSld>
@@ -18829,7 +18749,7 @@
         </p:spPr>
         <p:txBody>
           <a:bodyPr>
-            <a:normAutofit fontScale="92500" lnSpcReduction="20000"/>
+            <a:normAutofit fontScale="77500" lnSpcReduction="20000"/>
           </a:bodyPr>
           <a:lstStyle/>
           <a:p>
@@ -18843,7 +18763,11 @@
             </a:r>
             <a:r>
               <a:rPr lang="en-US" dirty="0" smtClean="0"/>
-              <a:t>four different clustering algorithms</a:t>
+              <a:t>five different </a:t>
+            </a:r>
+            <a:r>
+              <a:rPr lang="en-US" dirty="0" smtClean="0"/>
+              <a:t>clustering algorithms</a:t>
             </a:r>
           </a:p>
           <a:p>
@@ -18884,6 +18808,21 @@
             <a:r>
               <a:rPr lang="en-US" dirty="0" smtClean="0"/>
               <a:t>k-means </a:t>
+            </a:r>
+            <a:endParaRPr lang="en-US" dirty="0" smtClean="0"/>
+          </a:p>
+          <a:p>
+            <a:pPr lvl="1">
+              <a:buFont typeface="Wingdings" panose="05000000000000000000" pitchFamily="2" charset="2"/>
+              <a:buChar char="v"/>
+            </a:pPr>
+            <a:r>
+              <a:rPr lang="en-US" dirty="0" smtClean="0"/>
+              <a:t>K-</a:t>
+            </a:r>
+            <a:r>
+              <a:rPr lang="en-US" dirty="0" err="1" smtClean="0"/>
+              <a:t>medoids</a:t>
             </a:r>
             <a:endParaRPr lang="en-US" dirty="0" smtClean="0"/>
           </a:p>
@@ -18903,7 +18842,6 @@
               <a:rPr lang="en-US" dirty="0" smtClean="0"/>
               <a:t>Used hamming distance method to evaluate each algorithm</a:t>
             </a:r>
-            <a:endParaRPr lang="en-US" dirty="0" smtClean="0"/>
           </a:p>
         </p:txBody>
       </p:sp>
@@ -19141,13 +19079,6 @@
                         </a:rPr>
                         <a:t>4</a:t>
                       </a:r>
-                      <a:endParaRPr lang="en-US" sz="1200" dirty="0" smtClean="0">
-                        <a:solidFill>
-                          <a:srgbClr val="123654"/>
-                        </a:solidFill>
-                        <a:effectLst/>
-                        <a:latin typeface="+mn-lt"/>
-                      </a:endParaRPr>
                     </a:p>
                   </a:txBody>
                   <a:tcPr marL="57150" marR="57150" marT="57150" marB="57150" anchor="ctr"/>
@@ -19616,15 +19547,6 @@
                         </a:rPr>
                         <a:t> Link</a:t>
                       </a:r>
-                      <a:endParaRPr lang="en-US" sz="1000" b="1" kern="1200" dirty="0" smtClean="0">
-                        <a:solidFill>
-                          <a:srgbClr val="123654"/>
-                        </a:solidFill>
-                        <a:effectLst/>
-                        <a:latin typeface="Arial" panose="020B0604020202020204" pitchFamily="34" charset="0"/>
-                        <a:ea typeface="+mn-ea"/>
-                        <a:cs typeface="+mn-cs"/>
-                      </a:endParaRPr>
                     </a:p>
                   </a:txBody>
                   <a:tcPr marL="57150" marR="57150" marT="57150" marB="57150" anchor="ctr"/>
@@ -19692,445 +19614,6 @@
       </p:grpSpPr>
       <p:sp>
         <p:nvSpPr>
-          <p:cNvPr id="6" name="标题 1"/>
-          <p:cNvSpPr txBox="1">
-            <a:spLocks/>
-          </p:cNvSpPr>
-          <p:nvPr/>
-        </p:nvSpPr>
-        <p:spPr>
-          <a:xfrm>
-            <a:off x="1275271" y="1199013"/>
-            <a:ext cx="10515600" cy="618285"/>
-          </a:xfrm>
-          <a:prstGeom prst="rect">
-            <a:avLst/>
-          </a:prstGeom>
-        </p:spPr>
-        <p:txBody>
-          <a:bodyPr vert="horz" lIns="91440" tIns="45720" rIns="91440" bIns="45720" rtlCol="0" anchor="b">
-            <a:normAutofit fontScale="90000" lnSpcReduction="10000"/>
-          </a:bodyPr>
-          <a:lstStyle>
-            <a:lvl1pPr marL="0" algn="l" defTabSz="914400" rtl="0" eaLnBrk="1" latinLnBrk="0" hangingPunct="1">
-              <a:lnSpc>
-                <a:spcPct val="85000"/>
-              </a:lnSpc>
-              <a:spcBef>
-                <a:spcPct val="0"/>
-              </a:spcBef>
-              <a:buNone/>
-              <a:defRPr sz="4800" kern="1200" spc="-50" baseline="0">
-                <a:solidFill>
-                  <a:schemeClr val="tx1">
-                    <a:lumMod val="75000"/>
-                    <a:lumOff val="25000"/>
-                  </a:schemeClr>
-                </a:solidFill>
-                <a:latin typeface="+mj-lt"/>
-                <a:ea typeface="+mj-ea"/>
-                <a:cs typeface="+mj-cs"/>
-              </a:defRPr>
-            </a:lvl1pPr>
-          </a:lstStyle>
-          <a:p>
-            <a:r>
-              <a:rPr lang="en-US" smtClean="0"/>
-              <a:t>Accuracy Comparison</a:t>
-            </a:r>
-            <a:endParaRPr lang="en-US" dirty="0"/>
-          </a:p>
-        </p:txBody>
-      </p:sp>
-      <p:graphicFrame>
-        <p:nvGraphicFramePr>
-          <p:cNvPr id="7" name="表格 6"/>
-          <p:cNvGraphicFramePr>
-            <a:graphicFrameLocks noGrp="1"/>
-          </p:cNvGraphicFramePr>
-          <p:nvPr>
-            <p:extLst>
-              <p:ext uri="{D42A27DB-BD31-4B8C-83A1-F6EECF244321}">
-                <p14:modId xmlns:p14="http://schemas.microsoft.com/office/powerpoint/2010/main" val="4046558615"/>
-              </p:ext>
-            </p:extLst>
-          </p:nvPr>
-        </p:nvGraphicFramePr>
-        <p:xfrm>
-          <a:off x="1122871" y="2222166"/>
-          <a:ext cx="9358223" cy="1411281"/>
-        </p:xfrm>
-        <a:graphic>
-          <a:graphicData uri="http://schemas.openxmlformats.org/drawingml/2006/table">
-            <a:tbl>
-              <a:tblPr firstRow="1" bandRow="1">
-                <a:tableStyleId>{5C22544A-7EE6-4342-B048-85BDC9FD1C3A}</a:tableStyleId>
-              </a:tblPr>
-              <a:tblGrid>
-                <a:gridCol w="1411907"/>
-                <a:gridCol w="2020622"/>
-                <a:gridCol w="2106001"/>
-                <a:gridCol w="2011136"/>
-                <a:gridCol w="1808557"/>
-              </a:tblGrid>
-              <a:tr h="771201">
-                <a:tc>
-                  <a:txBody>
-                    <a:bodyPr/>
-                    <a:lstStyle/>
-                    <a:p>
-                      <a:r>
-                        <a:rPr lang="en-US" dirty="0" smtClean="0"/>
-                        <a:t>Iris</a:t>
-                      </a:r>
-                      <a:endParaRPr lang="en-US" dirty="0"/>
-                    </a:p>
-                  </a:txBody>
-                  <a:tcPr/>
-                </a:tc>
-                <a:tc>
-                  <a:txBody>
-                    <a:bodyPr/>
-                    <a:lstStyle/>
-                    <a:p>
-                      <a:pPr marL="0" marR="0" indent="0" algn="l" defTabSz="914400" rtl="0" eaLnBrk="1" fontAlgn="auto" latinLnBrk="0" hangingPunct="1">
-                        <a:lnSpc>
-                          <a:spcPct val="100000"/>
-                        </a:lnSpc>
-                        <a:spcBef>
-                          <a:spcPts val="0"/>
-                        </a:spcBef>
-                        <a:spcAft>
-                          <a:spcPts val="0"/>
-                        </a:spcAft>
-                        <a:buClrTx/>
-                        <a:buSzTx/>
-                        <a:buFontTx/>
-                        <a:buNone/>
-                        <a:tabLst/>
-                        <a:defRPr/>
-                      </a:pPr>
-                      <a:r>
-                        <a:rPr lang="en-US" dirty="0" smtClean="0"/>
-                        <a:t>Single-Linkage</a:t>
-                      </a:r>
-                      <a:endParaRPr lang="en-US" dirty="0" smtClean="0"/>
-                    </a:p>
-                  </a:txBody>
-                  <a:tcPr/>
-                </a:tc>
-                <a:tc>
-                  <a:txBody>
-                    <a:bodyPr/>
-                    <a:lstStyle/>
-                    <a:p>
-                      <a:pPr marL="0" marR="0" indent="0" algn="l" defTabSz="914400" rtl="0" eaLnBrk="1" fontAlgn="auto" latinLnBrk="0" hangingPunct="1">
-                        <a:lnSpc>
-                          <a:spcPct val="100000"/>
-                        </a:lnSpc>
-                        <a:spcBef>
-                          <a:spcPts val="0"/>
-                        </a:spcBef>
-                        <a:spcAft>
-                          <a:spcPts val="0"/>
-                        </a:spcAft>
-                        <a:buClrTx/>
-                        <a:buSzTx/>
-                        <a:buFontTx/>
-                        <a:buNone/>
-                        <a:tabLst/>
-                        <a:defRPr/>
-                      </a:pPr>
-                      <a:r>
-                        <a:rPr lang="en-US" dirty="0" smtClean="0"/>
-                        <a:t>Complete-Linkage</a:t>
-                      </a:r>
-                    </a:p>
-                  </a:txBody>
-                  <a:tcPr/>
-                </a:tc>
-                <a:tc>
-                  <a:txBody>
-                    <a:bodyPr/>
-                    <a:lstStyle/>
-                    <a:p>
-                      <a:pPr marL="0" marR="0" indent="0" algn="l" defTabSz="914400" rtl="0" eaLnBrk="1" fontAlgn="auto" latinLnBrk="0" hangingPunct="1">
-                        <a:lnSpc>
-                          <a:spcPct val="100000"/>
-                        </a:lnSpc>
-                        <a:spcBef>
-                          <a:spcPts val="0"/>
-                        </a:spcBef>
-                        <a:spcAft>
-                          <a:spcPts val="0"/>
-                        </a:spcAft>
-                        <a:buClrTx/>
-                        <a:buSzTx/>
-                        <a:buFontTx/>
-                        <a:buNone/>
-                        <a:tabLst/>
-                        <a:defRPr/>
-                      </a:pPr>
-                      <a:r>
-                        <a:rPr lang="en-US" dirty="0" smtClean="0"/>
-                        <a:t>Average-Linkage</a:t>
-                      </a:r>
-                    </a:p>
-                  </a:txBody>
-                  <a:tcPr/>
-                </a:tc>
-                <a:tc>
-                  <a:txBody>
-                    <a:bodyPr/>
-                    <a:lstStyle/>
-                    <a:p>
-                      <a:pPr marL="0" marR="0" indent="0" algn="l" defTabSz="914400" rtl="0" eaLnBrk="1" fontAlgn="auto" latinLnBrk="0" hangingPunct="1">
-                        <a:lnSpc>
-                          <a:spcPct val="100000"/>
-                        </a:lnSpc>
-                        <a:spcBef>
-                          <a:spcPts val="0"/>
-                        </a:spcBef>
-                        <a:spcAft>
-                          <a:spcPts val="0"/>
-                        </a:spcAft>
-                        <a:buClrTx/>
-                        <a:buSzTx/>
-                        <a:buFontTx/>
-                        <a:buNone/>
-                        <a:tabLst/>
-                        <a:defRPr/>
-                      </a:pPr>
-                      <a:r>
-                        <a:rPr lang="en-US" dirty="0" smtClean="0"/>
-                        <a:t>Lloyd’s-Method</a:t>
-                      </a:r>
-                    </a:p>
-                    <a:p>
-                      <a:pPr marL="0" marR="0" indent="0" algn="l" defTabSz="914400" rtl="0" eaLnBrk="1" fontAlgn="auto" latinLnBrk="0" hangingPunct="1">
-                        <a:lnSpc>
-                          <a:spcPct val="100000"/>
-                        </a:lnSpc>
-                        <a:spcBef>
-                          <a:spcPts val="0"/>
-                        </a:spcBef>
-                        <a:spcAft>
-                          <a:spcPts val="0"/>
-                        </a:spcAft>
-                        <a:buClrTx/>
-                        <a:buSzTx/>
-                        <a:buFontTx/>
-                        <a:buNone/>
-                        <a:tabLst/>
-                        <a:defRPr/>
-                      </a:pPr>
-                      <a:r>
-                        <a:rPr lang="en-US" dirty="0" smtClean="0"/>
-                        <a:t>(k-means)</a:t>
-                      </a:r>
-                      <a:endParaRPr lang="en-US" dirty="0" smtClean="0"/>
-                    </a:p>
-                  </a:txBody>
-                  <a:tcPr/>
-                </a:tc>
-              </a:tr>
-              <a:tr h="458380">
-                <a:tc>
-                  <a:txBody>
-                    <a:bodyPr/>
-                    <a:lstStyle/>
-                    <a:p>
-                      <a:pPr marL="0" marR="0" indent="0" algn="l" defTabSz="914400" rtl="0" eaLnBrk="1" fontAlgn="auto" latinLnBrk="0" hangingPunct="1">
-                        <a:lnSpc>
-                          <a:spcPct val="100000"/>
-                        </a:lnSpc>
-                        <a:spcBef>
-                          <a:spcPts val="0"/>
-                        </a:spcBef>
-                        <a:spcAft>
-                          <a:spcPts val="0"/>
-                        </a:spcAft>
-                        <a:buClrTx/>
-                        <a:buSzTx/>
-                        <a:buFontTx/>
-                        <a:buNone/>
-                        <a:tabLst/>
-                        <a:defRPr/>
-                      </a:pPr>
-                      <a:r>
-                        <a:rPr lang="en-US" dirty="0" smtClean="0"/>
-                        <a:t>Hamming</a:t>
-                      </a:r>
-                    </a:p>
-                    <a:p>
-                      <a:pPr marL="0" marR="0" indent="0" algn="l" defTabSz="914400" rtl="0" eaLnBrk="1" fontAlgn="auto" latinLnBrk="0" hangingPunct="1">
-                        <a:lnSpc>
-                          <a:spcPct val="100000"/>
-                        </a:lnSpc>
-                        <a:spcBef>
-                          <a:spcPts val="0"/>
-                        </a:spcBef>
-                        <a:spcAft>
-                          <a:spcPts val="0"/>
-                        </a:spcAft>
-                        <a:buClrTx/>
-                        <a:buSzTx/>
-                        <a:buFontTx/>
-                        <a:buNone/>
-                        <a:tabLst/>
-                        <a:defRPr/>
-                      </a:pPr>
-                      <a:r>
-                        <a:rPr lang="en-US" dirty="0" smtClean="0"/>
-                        <a:t>distance</a:t>
-                      </a:r>
-                      <a:endParaRPr lang="en-US" dirty="0" smtClean="0"/>
-                    </a:p>
-                  </a:txBody>
-                  <a:tcPr/>
-                </a:tc>
-                <a:tc>
-                  <a:txBody>
-                    <a:bodyPr/>
-                    <a:lstStyle/>
-                    <a:p>
-                      <a:r>
-                        <a:rPr lang="en-US" dirty="0" smtClean="0"/>
-                        <a:t>0.32</a:t>
-                      </a:r>
-                      <a:endParaRPr lang="en-US" dirty="0"/>
-                    </a:p>
-                  </a:txBody>
-                  <a:tcPr/>
-                </a:tc>
-                <a:tc>
-                  <a:txBody>
-                    <a:bodyPr/>
-                    <a:lstStyle/>
-                    <a:p>
-                      <a:r>
-                        <a:rPr lang="en-US" dirty="0" smtClean="0"/>
-                        <a:t>0.16</a:t>
-                      </a:r>
-                      <a:endParaRPr lang="en-US" dirty="0"/>
-                    </a:p>
-                  </a:txBody>
-                  <a:tcPr/>
-                </a:tc>
-                <a:tc>
-                  <a:txBody>
-                    <a:bodyPr/>
-                    <a:lstStyle/>
-                    <a:p>
-                      <a:r>
-                        <a:rPr lang="en-US" dirty="0" smtClean="0"/>
-                        <a:t>0.0933333333333</a:t>
-                      </a:r>
-                      <a:endParaRPr lang="en-US" dirty="0"/>
-                    </a:p>
-                  </a:txBody>
-                  <a:tcPr/>
-                </a:tc>
-                <a:tc>
-                  <a:txBody>
-                    <a:bodyPr/>
-                    <a:lstStyle/>
-                    <a:p>
-                      <a:r>
-                        <a:rPr lang="en-US" dirty="0" smtClean="0"/>
-                        <a:t>0.106666666667</a:t>
-                      </a:r>
-                      <a:endParaRPr lang="en-US" dirty="0"/>
-                    </a:p>
-                  </a:txBody>
-                  <a:tcPr/>
-                </a:tc>
-              </a:tr>
-            </a:tbl>
-          </a:graphicData>
-        </a:graphic>
-      </p:graphicFrame>
-      <p:sp>
-        <p:nvSpPr>
-          <p:cNvPr id="8" name="内容占位符 2"/>
-          <p:cNvSpPr>
-            <a:spLocks noGrp="1"/>
-          </p:cNvSpPr>
-          <p:nvPr>
-            <p:ph idx="1"/>
-          </p:nvPr>
-        </p:nvSpPr>
-        <p:spPr>
-          <a:xfrm>
-            <a:off x="1010728" y="4528867"/>
-            <a:ext cx="9401355" cy="1017917"/>
-          </a:xfrm>
-        </p:spPr>
-        <p:txBody>
-          <a:bodyPr>
-            <a:normAutofit/>
-          </a:bodyPr>
-          <a:lstStyle/>
-          <a:p>
-            <a:pPr marL="0" indent="0">
-              <a:buNone/>
-            </a:pPr>
-            <a:r>
-              <a:rPr lang="en-US" dirty="0" smtClean="0"/>
-              <a:t>Single-Linkage does not work well for this data set</a:t>
-            </a:r>
-          </a:p>
-          <a:p>
-            <a:pPr marL="0" indent="0">
-              <a:buNone/>
-            </a:pPr>
-            <a:r>
-              <a:rPr lang="en-US" dirty="0" smtClean="0"/>
-              <a:t>The rest three algorithms are good.</a:t>
-            </a:r>
-            <a:endParaRPr lang="en-US" dirty="0" smtClean="0"/>
-          </a:p>
-        </p:txBody>
-      </p:sp>
-    </p:spTree>
-    <p:extLst>
-      <p:ext uri="{BB962C8B-B14F-4D97-AF65-F5344CB8AC3E}">
-        <p14:creationId xmlns:p14="http://schemas.microsoft.com/office/powerpoint/2010/main" val="3999078308"/>
-      </p:ext>
-    </p:extLst>
-  </p:cSld>
-  <p:clrMapOvr>
-    <a:masterClrMapping/>
-  </p:clrMapOvr>
-  <p:timing>
-    <p:tnLst>
-      <p:par>
-        <p:cTn id="1" dur="indefinite" restart="never" nodeType="tmRoot"/>
-      </p:par>
-    </p:tnLst>
-  </p:timing>
-</p:sld>
-</file>
-
-<file path=ppt/slides/slide5.xml><?xml version="1.0" encoding="utf-8"?>
-<p:sld xmlns:a="http://schemas.openxmlformats.org/drawingml/2006/main" xmlns:r="http://schemas.openxmlformats.org/officeDocument/2006/relationships" xmlns:p="http://schemas.openxmlformats.org/presentationml/2006/main">
-  <p:cSld>
-    <p:spTree>
-      <p:nvGrpSpPr>
-        <p:cNvPr id="1" name=""/>
-        <p:cNvGrpSpPr/>
-        <p:nvPr/>
-      </p:nvGrpSpPr>
-      <p:grpSpPr>
-        <a:xfrm>
-          <a:off x="0" y="0"/>
-          <a:ext cx="0" cy="0"/>
-          <a:chOff x="0" y="0"/>
-          <a:chExt cx="0" cy="0"/>
-        </a:xfrm>
-      </p:grpSpPr>
-      <p:sp>
-        <p:nvSpPr>
           <p:cNvPr id="2" name="标题 1"/>
           <p:cNvSpPr>
             <a:spLocks noGrp="1"/>
@@ -20157,7 +19640,6 @@
               <a:rPr lang="en-US" dirty="0"/>
               <a:t> </a:t>
             </a:r>
-            <a:endParaRPr lang="en-US" dirty="0"/>
           </a:p>
         </p:txBody>
       </p:sp>
@@ -20169,11 +19651,7 @@
           </p:cNvGraphicFramePr>
           <p:nvPr>
             <p:ph idx="1"/>
-            <p:extLst>
-              <p:ext uri="{D42A27DB-BD31-4B8C-83A1-F6EECF244321}">
-                <p14:modId xmlns:p14="http://schemas.microsoft.com/office/powerpoint/2010/main" val="1519644257"/>
-              </p:ext>
-            </p:extLst>
+            <p:extLst/>
           </p:nvPr>
         </p:nvGraphicFramePr>
         <p:xfrm>
@@ -20324,13 +19802,6 @@
                         </a:rPr>
                         <a:t>5</a:t>
                       </a:r>
-                      <a:endParaRPr lang="en-US" sz="1000" dirty="0" smtClean="0">
-                        <a:solidFill>
-                          <a:srgbClr val="123654"/>
-                        </a:solidFill>
-                        <a:effectLst/>
-                        <a:latin typeface="Arial" panose="020B0604020202020204" pitchFamily="34" charset="0"/>
-                      </a:endParaRPr>
                     </a:p>
                   </a:txBody>
                   <a:tcPr marL="57150" marR="57150" marT="57150" marB="57150" anchor="ctr"/>
@@ -20714,15 +20185,6 @@
                         </a:rPr>
                         <a:t>UNS (The knowledge level of user) (target value) </a:t>
                       </a:r>
-                      <a:endParaRPr lang="en-US" sz="1000" kern="1200" dirty="0" smtClean="0">
-                        <a:solidFill>
-                          <a:srgbClr val="123654"/>
-                        </a:solidFill>
-                        <a:effectLst/>
-                        <a:latin typeface="Arial" panose="020B0604020202020204" pitchFamily="34" charset="0"/>
-                        <a:ea typeface="+mn-ea"/>
-                        <a:cs typeface="+mn-cs"/>
-                      </a:endParaRPr>
                     </a:p>
                   </a:txBody>
                   <a:tcPr marL="57150" marR="57150" marT="57150" marB="57150" anchor="ctr"/>
@@ -20916,15 +20378,6 @@
                         </a:rPr>
                         <a:t> Link</a:t>
                       </a:r>
-                      <a:endParaRPr lang="en-US" sz="1000" b="1" kern="1200" dirty="0" smtClean="0">
-                        <a:solidFill>
-                          <a:srgbClr val="123654"/>
-                        </a:solidFill>
-                        <a:effectLst/>
-                        <a:latin typeface="Arial" panose="020B0604020202020204" pitchFamily="34" charset="0"/>
-                        <a:ea typeface="+mn-ea"/>
-                        <a:cs typeface="+mn-cs"/>
-                      </a:endParaRPr>
                     </a:p>
                   </a:txBody>
                   <a:tcPr marL="57150" marR="57150" marT="57150" marB="57150" anchor="ctr"/>
@@ -20963,7 +20416,7 @@
     </p:spTree>
     <p:extLst>
       <p:ext uri="{BB962C8B-B14F-4D97-AF65-F5344CB8AC3E}">
-        <p14:creationId xmlns:p14="http://schemas.microsoft.com/office/powerpoint/2010/main" val="2177104298"/>
+        <p14:creationId xmlns:p14="http://schemas.microsoft.com/office/powerpoint/2010/main" val="3361677100"/>
       </p:ext>
     </p:extLst>
   </p:cSld>
@@ -20973,7 +20426,7 @@
 </p:sld>
 </file>
 
-<file path=ppt/slides/slide6.xml><?xml version="1.0" encoding="utf-8"?>
+<file path=ppt/slides/slide5.xml><?xml version="1.0" encoding="utf-8"?>
 <p:sld xmlns:a="http://schemas.openxmlformats.org/drawingml/2006/main" xmlns:r="http://schemas.openxmlformats.org/officeDocument/2006/relationships" xmlns:p="http://schemas.openxmlformats.org/presentationml/2006/main">
   <p:cSld>
     <p:spTree>
@@ -21000,421 +20453,6 @@
             <p:ph type="title"/>
           </p:nvPr>
         </p:nvSpPr>
-        <p:spPr/>
-        <p:txBody>
-          <a:bodyPr/>
-          <a:lstStyle/>
-          <a:p>
-            <a:r>
-              <a:rPr lang="en-US" dirty="0" smtClean="0"/>
-              <a:t>Accuracy Comparison</a:t>
-            </a:r>
-            <a:endParaRPr lang="en-US" dirty="0"/>
-          </a:p>
-        </p:txBody>
-      </p:sp>
-      <p:graphicFrame>
-        <p:nvGraphicFramePr>
-          <p:cNvPr id="7" name="表格 6"/>
-          <p:cNvGraphicFramePr>
-            <a:graphicFrameLocks noGrp="1"/>
-          </p:cNvGraphicFramePr>
-          <p:nvPr>
-            <p:extLst>
-              <p:ext uri="{D42A27DB-BD31-4B8C-83A1-F6EECF244321}">
-                <p14:modId xmlns:p14="http://schemas.microsoft.com/office/powerpoint/2010/main" val="2726625108"/>
-              </p:ext>
-            </p:extLst>
-          </p:nvPr>
-        </p:nvGraphicFramePr>
-        <p:xfrm>
-          <a:off x="1097279" y="2230792"/>
-          <a:ext cx="9763377" cy="1411281"/>
-        </p:xfrm>
-        <a:graphic>
-          <a:graphicData uri="http://schemas.openxmlformats.org/drawingml/2006/table">
-            <a:tbl>
-              <a:tblPr firstRow="1" bandRow="1">
-                <a:tableStyleId>{5C22544A-7EE6-4342-B048-85BDC9FD1C3A}</a:tableStyleId>
-              </a:tblPr>
-              <a:tblGrid>
-                <a:gridCol w="1440393"/>
-                <a:gridCol w="2061390"/>
-                <a:gridCol w="2148491"/>
-                <a:gridCol w="2051712"/>
-                <a:gridCol w="2061391"/>
-              </a:tblGrid>
-              <a:tr h="771201">
-                <a:tc>
-                  <a:txBody>
-                    <a:bodyPr/>
-                    <a:lstStyle/>
-                    <a:p>
-                      <a:r>
-                        <a:rPr lang="en-US" dirty="0" smtClean="0"/>
-                        <a:t>User Knowledge</a:t>
-                      </a:r>
-                      <a:endParaRPr lang="en-US" dirty="0"/>
-                    </a:p>
-                  </a:txBody>
-                  <a:tcPr/>
-                </a:tc>
-                <a:tc>
-                  <a:txBody>
-                    <a:bodyPr/>
-                    <a:lstStyle/>
-                    <a:p>
-                      <a:pPr marL="0" marR="0" indent="0" algn="l" defTabSz="914400" rtl="0" eaLnBrk="1" fontAlgn="auto" latinLnBrk="0" hangingPunct="1">
-                        <a:lnSpc>
-                          <a:spcPct val="100000"/>
-                        </a:lnSpc>
-                        <a:spcBef>
-                          <a:spcPts val="0"/>
-                        </a:spcBef>
-                        <a:spcAft>
-                          <a:spcPts val="0"/>
-                        </a:spcAft>
-                        <a:buClrTx/>
-                        <a:buSzTx/>
-                        <a:buFontTx/>
-                        <a:buNone/>
-                        <a:tabLst/>
-                        <a:defRPr/>
-                      </a:pPr>
-                      <a:r>
-                        <a:rPr lang="en-US" dirty="0" smtClean="0"/>
-                        <a:t>Single-Linkage</a:t>
-                      </a:r>
-                      <a:endParaRPr lang="en-US" dirty="0" smtClean="0"/>
-                    </a:p>
-                  </a:txBody>
-                  <a:tcPr/>
-                </a:tc>
-                <a:tc>
-                  <a:txBody>
-                    <a:bodyPr/>
-                    <a:lstStyle/>
-                    <a:p>
-                      <a:pPr marL="0" marR="0" indent="0" algn="l" defTabSz="914400" rtl="0" eaLnBrk="1" fontAlgn="auto" latinLnBrk="0" hangingPunct="1">
-                        <a:lnSpc>
-                          <a:spcPct val="100000"/>
-                        </a:lnSpc>
-                        <a:spcBef>
-                          <a:spcPts val="0"/>
-                        </a:spcBef>
-                        <a:spcAft>
-                          <a:spcPts val="0"/>
-                        </a:spcAft>
-                        <a:buClrTx/>
-                        <a:buSzTx/>
-                        <a:buFontTx/>
-                        <a:buNone/>
-                        <a:tabLst/>
-                        <a:defRPr/>
-                      </a:pPr>
-                      <a:r>
-                        <a:rPr lang="en-US" dirty="0" smtClean="0"/>
-                        <a:t>Complete-Linkage</a:t>
-                      </a:r>
-                    </a:p>
-                  </a:txBody>
-                  <a:tcPr/>
-                </a:tc>
-                <a:tc>
-                  <a:txBody>
-                    <a:bodyPr/>
-                    <a:lstStyle/>
-                    <a:p>
-                      <a:pPr marL="0" marR="0" indent="0" algn="l" defTabSz="914400" rtl="0" eaLnBrk="1" fontAlgn="auto" latinLnBrk="0" hangingPunct="1">
-                        <a:lnSpc>
-                          <a:spcPct val="100000"/>
-                        </a:lnSpc>
-                        <a:spcBef>
-                          <a:spcPts val="0"/>
-                        </a:spcBef>
-                        <a:spcAft>
-                          <a:spcPts val="0"/>
-                        </a:spcAft>
-                        <a:buClrTx/>
-                        <a:buSzTx/>
-                        <a:buFontTx/>
-                        <a:buNone/>
-                        <a:tabLst/>
-                        <a:defRPr/>
-                      </a:pPr>
-                      <a:r>
-                        <a:rPr lang="en-US" dirty="0" smtClean="0"/>
-                        <a:t>Average-Linkage</a:t>
-                      </a:r>
-                    </a:p>
-                  </a:txBody>
-                  <a:tcPr/>
-                </a:tc>
-                <a:tc>
-                  <a:txBody>
-                    <a:bodyPr/>
-                    <a:lstStyle/>
-                    <a:p>
-                      <a:pPr marL="0" marR="0" indent="0" algn="l" defTabSz="914400" rtl="0" eaLnBrk="1" fontAlgn="auto" latinLnBrk="0" hangingPunct="1">
-                        <a:lnSpc>
-                          <a:spcPct val="100000"/>
-                        </a:lnSpc>
-                        <a:spcBef>
-                          <a:spcPts val="0"/>
-                        </a:spcBef>
-                        <a:spcAft>
-                          <a:spcPts val="0"/>
-                        </a:spcAft>
-                        <a:buClrTx/>
-                        <a:buSzTx/>
-                        <a:buFontTx/>
-                        <a:buNone/>
-                        <a:tabLst/>
-                        <a:defRPr/>
-                      </a:pPr>
-                      <a:r>
-                        <a:rPr lang="en-US" dirty="0" smtClean="0"/>
-                        <a:t>Lloyd’s-Method</a:t>
-                      </a:r>
-                    </a:p>
-                    <a:p>
-                      <a:pPr marL="0" marR="0" indent="0" algn="l" defTabSz="914400" rtl="0" eaLnBrk="1" fontAlgn="auto" latinLnBrk="0" hangingPunct="1">
-                        <a:lnSpc>
-                          <a:spcPct val="100000"/>
-                        </a:lnSpc>
-                        <a:spcBef>
-                          <a:spcPts val="0"/>
-                        </a:spcBef>
-                        <a:spcAft>
-                          <a:spcPts val="0"/>
-                        </a:spcAft>
-                        <a:buClrTx/>
-                        <a:buSzTx/>
-                        <a:buFontTx/>
-                        <a:buNone/>
-                        <a:tabLst/>
-                        <a:defRPr/>
-                      </a:pPr>
-                      <a:r>
-                        <a:rPr lang="en-US" dirty="0" smtClean="0"/>
-                        <a:t>(k-means)</a:t>
-                      </a:r>
-                      <a:endParaRPr lang="en-US" dirty="0" smtClean="0"/>
-                    </a:p>
-                  </a:txBody>
-                  <a:tcPr/>
-                </a:tc>
-              </a:tr>
-              <a:tr h="458380">
-                <a:tc>
-                  <a:txBody>
-                    <a:bodyPr/>
-                    <a:lstStyle/>
-                    <a:p>
-                      <a:pPr marL="0" marR="0" indent="0" algn="l" defTabSz="914400" rtl="0" eaLnBrk="1" fontAlgn="auto" latinLnBrk="0" hangingPunct="1">
-                        <a:lnSpc>
-                          <a:spcPct val="100000"/>
-                        </a:lnSpc>
-                        <a:spcBef>
-                          <a:spcPts val="0"/>
-                        </a:spcBef>
-                        <a:spcAft>
-                          <a:spcPts val="0"/>
-                        </a:spcAft>
-                        <a:buClrTx/>
-                        <a:buSzTx/>
-                        <a:buFontTx/>
-                        <a:buNone/>
-                        <a:tabLst/>
-                        <a:defRPr/>
-                      </a:pPr>
-                      <a:r>
-                        <a:rPr lang="en-US" dirty="0" smtClean="0"/>
-                        <a:t>Hamming</a:t>
-                      </a:r>
-                    </a:p>
-                    <a:p>
-                      <a:pPr marL="0" marR="0" indent="0" algn="l" defTabSz="914400" rtl="0" eaLnBrk="1" fontAlgn="auto" latinLnBrk="0" hangingPunct="1">
-                        <a:lnSpc>
-                          <a:spcPct val="100000"/>
-                        </a:lnSpc>
-                        <a:spcBef>
-                          <a:spcPts val="0"/>
-                        </a:spcBef>
-                        <a:spcAft>
-                          <a:spcPts val="0"/>
-                        </a:spcAft>
-                        <a:buClrTx/>
-                        <a:buSzTx/>
-                        <a:buFontTx/>
-                        <a:buNone/>
-                        <a:tabLst/>
-                        <a:defRPr/>
-                      </a:pPr>
-                      <a:r>
-                        <a:rPr lang="en-US" dirty="0" smtClean="0"/>
-                        <a:t>distance</a:t>
-                      </a:r>
-                      <a:endParaRPr lang="en-US" dirty="0" smtClean="0"/>
-                    </a:p>
-                  </a:txBody>
-                  <a:tcPr/>
-                </a:tc>
-                <a:tc>
-                  <a:txBody>
-                    <a:bodyPr/>
-                    <a:lstStyle/>
-                    <a:p>
-                      <a:r>
-                        <a:rPr lang="en-US" dirty="0" smtClean="0"/>
-                        <a:t>0.669975186104</a:t>
-                      </a:r>
-                      <a:endParaRPr lang="en-US" dirty="0"/>
-                    </a:p>
-                  </a:txBody>
-                  <a:tcPr/>
-                </a:tc>
-                <a:tc>
-                  <a:txBody>
-                    <a:bodyPr/>
-                    <a:lstStyle/>
-                    <a:p>
-                      <a:r>
-                        <a:rPr lang="en-US" dirty="0" smtClean="0"/>
-                        <a:t>0.111662531017</a:t>
-                      </a:r>
-                      <a:endParaRPr lang="en-US" dirty="0"/>
-                    </a:p>
-                  </a:txBody>
-                  <a:tcPr/>
-                </a:tc>
-                <a:tc>
-                  <a:txBody>
-                    <a:bodyPr/>
-                    <a:lstStyle/>
-                    <a:p>
-                      <a:r>
-                        <a:rPr lang="en-US" dirty="0" smtClean="0"/>
-                        <a:t>0.543424317618</a:t>
-                      </a:r>
-                      <a:endParaRPr lang="en-US" dirty="0"/>
-                    </a:p>
-                  </a:txBody>
-                  <a:tcPr/>
-                </a:tc>
-                <a:tc>
-                  <a:txBody>
-                    <a:bodyPr/>
-                    <a:lstStyle/>
-                    <a:p>
-                      <a:r>
-                        <a:rPr lang="en-US" dirty="0" smtClean="0"/>
-                        <a:t>0.158808933002</a:t>
-                      </a:r>
-                      <a:endParaRPr lang="en-US" dirty="0"/>
-                    </a:p>
-                  </a:txBody>
-                  <a:tcPr/>
-                </a:tc>
-              </a:tr>
-            </a:tbl>
-          </a:graphicData>
-        </a:graphic>
-      </p:graphicFrame>
-      <p:sp>
-        <p:nvSpPr>
-          <p:cNvPr id="5" name="内容占位符 2"/>
-          <p:cNvSpPr>
-            <a:spLocks noGrp="1"/>
-          </p:cNvSpPr>
-          <p:nvPr>
-            <p:ph idx="1"/>
-          </p:nvPr>
-        </p:nvSpPr>
-        <p:spPr>
-          <a:xfrm>
-            <a:off x="1010728" y="4563374"/>
-            <a:ext cx="9401355" cy="862642"/>
-          </a:xfrm>
-        </p:spPr>
-        <p:txBody>
-          <a:bodyPr>
-            <a:normAutofit/>
-          </a:bodyPr>
-          <a:lstStyle/>
-          <a:p>
-            <a:pPr marL="0" indent="0">
-              <a:buNone/>
-            </a:pPr>
-            <a:r>
-              <a:rPr lang="en-US" dirty="0"/>
-              <a:t> </a:t>
-            </a:r>
-            <a:r>
-              <a:rPr lang="en-US" dirty="0" smtClean="0"/>
-              <a:t>Single-Linkage </a:t>
-            </a:r>
-            <a:r>
-              <a:rPr lang="en-US" dirty="0" smtClean="0"/>
-              <a:t>and Average-Linkage are</a:t>
-            </a:r>
-            <a:r>
-              <a:rPr lang="en-US" dirty="0" smtClean="0"/>
-              <a:t> not good for this data set</a:t>
-            </a:r>
-          </a:p>
-          <a:p>
-            <a:pPr marL="0" indent="0">
-              <a:buNone/>
-            </a:pPr>
-            <a:r>
-              <a:rPr lang="en-US" dirty="0" smtClean="0"/>
-              <a:t>For this data set, the Complete-Linkage works best.</a:t>
-            </a:r>
-            <a:endParaRPr lang="en-US" dirty="0" smtClean="0"/>
-          </a:p>
-        </p:txBody>
-      </p:sp>
-    </p:spTree>
-    <p:extLst>
-      <p:ext uri="{BB962C8B-B14F-4D97-AF65-F5344CB8AC3E}">
-        <p14:creationId xmlns:p14="http://schemas.microsoft.com/office/powerpoint/2010/main" val="3369144105"/>
-      </p:ext>
-    </p:extLst>
-  </p:cSld>
-  <p:clrMapOvr>
-    <a:masterClrMapping/>
-  </p:clrMapOvr>
-</p:sld>
-</file>
-
-<file path=ppt/slides/slide7.xml><?xml version="1.0" encoding="utf-8"?>
-<p:sld xmlns:a="http://schemas.openxmlformats.org/drawingml/2006/main" xmlns:r="http://schemas.openxmlformats.org/officeDocument/2006/relationships" xmlns:p="http://schemas.openxmlformats.org/presentationml/2006/main">
-  <p:cSld>
-    <p:spTree>
-      <p:nvGrpSpPr>
-        <p:cNvPr id="1" name=""/>
-        <p:cNvGrpSpPr/>
-        <p:nvPr/>
-      </p:nvGrpSpPr>
-      <p:grpSpPr>
-        <a:xfrm>
-          <a:off x="0" y="0"/>
-          <a:ext cx="0" cy="0"/>
-          <a:chOff x="0" y="0"/>
-          <a:chExt cx="0" cy="0"/>
-        </a:xfrm>
-      </p:grpSpPr>
-      <p:sp>
-        <p:nvSpPr>
-          <p:cNvPr id="2" name="标题 1"/>
-          <p:cNvSpPr>
-            <a:spLocks noGrp="1"/>
-          </p:cNvSpPr>
-          <p:nvPr>
-            <p:ph type="title"/>
-          </p:nvPr>
-        </p:nvSpPr>
         <p:spPr>
           <a:xfrm>
             <a:off x="1097280" y="465826"/>
@@ -21441,11 +20479,7 @@
           </p:cNvGraphicFramePr>
           <p:nvPr>
             <p:ph idx="1"/>
-            <p:extLst>
-              <p:ext uri="{D42A27DB-BD31-4B8C-83A1-F6EECF244321}">
-                <p14:modId xmlns:p14="http://schemas.microsoft.com/office/powerpoint/2010/main" val="294195370"/>
-              </p:ext>
-            </p:extLst>
+            <p:extLst/>
           </p:nvPr>
         </p:nvGraphicFramePr>
         <p:xfrm>
@@ -21618,13 +20652,6 @@
                         </a:rPr>
                         <a:t>7</a:t>
                       </a:r>
-                      <a:endParaRPr lang="en-US" sz="1000" dirty="0" smtClean="0">
-                        <a:solidFill>
-                          <a:srgbClr val="123654"/>
-                        </a:solidFill>
-                        <a:effectLst/>
-                        <a:latin typeface="Arial" panose="020B0604020202020204" pitchFamily="34" charset="0"/>
-                      </a:endParaRPr>
                     </a:p>
                   </a:txBody>
                   <a:tcPr marL="57150" marR="57150" marT="57150" marB="57150" anchor="ctr"/>
@@ -22031,15 +21058,6 @@
                         </a:rPr>
                         <a:t>length of kernel groove. </a:t>
                       </a:r>
-                      <a:endParaRPr lang="en-US" sz="1000" kern="1200" dirty="0" smtClean="0">
-                        <a:solidFill>
-                          <a:srgbClr val="123654"/>
-                        </a:solidFill>
-                        <a:effectLst/>
-                        <a:latin typeface="Arial" panose="020B0604020202020204" pitchFamily="34" charset="0"/>
-                        <a:ea typeface="+mn-ea"/>
-                        <a:cs typeface="+mn-cs"/>
-                      </a:endParaRPr>
                     </a:p>
                   </a:txBody>
                   <a:tcPr marL="57150" marR="57150" marT="57150" marB="57150" anchor="ctr"/>
@@ -22144,15 +21162,6 @@
                         </a:rPr>
                         <a:t> Link</a:t>
                       </a:r>
-                      <a:endParaRPr lang="en-US" sz="1000" b="1" kern="1200" dirty="0" smtClean="0">
-                        <a:solidFill>
-                          <a:srgbClr val="123654"/>
-                        </a:solidFill>
-                        <a:effectLst/>
-                        <a:latin typeface="Arial" panose="020B0604020202020204" pitchFamily="34" charset="0"/>
-                        <a:ea typeface="+mn-ea"/>
-                        <a:cs typeface="+mn-cs"/>
-                      </a:endParaRPr>
                     </a:p>
                   </a:txBody>
                   <a:tcPr marL="57150" marR="57150" marT="57150" marB="57150" anchor="ctr"/>
@@ -22191,7 +21200,7 @@
     </p:spTree>
     <p:extLst>
       <p:ext uri="{BB962C8B-B14F-4D97-AF65-F5344CB8AC3E}">
-        <p14:creationId xmlns:p14="http://schemas.microsoft.com/office/powerpoint/2010/main" val="886932332"/>
+        <p14:creationId xmlns:p14="http://schemas.microsoft.com/office/powerpoint/2010/main" val="1996741125"/>
       </p:ext>
     </p:extLst>
   </p:cSld>
@@ -22201,7 +21210,7 @@
 </p:sld>
 </file>
 
-<file path=ppt/slides/slide8.xml><?xml version="1.0" encoding="utf-8"?>
+<file path=ppt/slides/slide6.xml><?xml version="1.0" encoding="utf-8"?>
 <p:sld xmlns:a="http://schemas.openxmlformats.org/drawingml/2006/main" xmlns:r="http://schemas.openxmlformats.org/officeDocument/2006/relationships" xmlns:p="http://schemas.openxmlformats.org/presentationml/2006/main">
   <p:cSld>
     <p:spTree>
@@ -22220,21 +21229,50 @@
       </p:grpSpPr>
       <p:sp>
         <p:nvSpPr>
-          <p:cNvPr id="2" name="标题 1"/>
-          <p:cNvSpPr>
-            <a:spLocks noGrp="1"/>
-          </p:cNvSpPr>
-          <p:nvPr>
-            <p:ph type="title"/>
-          </p:nvPr>
-        </p:nvSpPr>
-        <p:spPr/>
-        <p:txBody>
-          <a:bodyPr/>
-          <a:lstStyle/>
-          <a:p>
-            <a:r>
-              <a:rPr lang="en-US" dirty="0" smtClean="0"/>
+          <p:cNvPr id="6" name="标题 1"/>
+          <p:cNvSpPr txBox="1">
+            <a:spLocks/>
+          </p:cNvSpPr>
+          <p:nvPr/>
+        </p:nvSpPr>
+        <p:spPr>
+          <a:xfrm>
+            <a:off x="1275271" y="1199013"/>
+            <a:ext cx="10515600" cy="618285"/>
+          </a:xfrm>
+          <a:prstGeom prst="rect">
+            <a:avLst/>
+          </a:prstGeom>
+        </p:spPr>
+        <p:txBody>
+          <a:bodyPr vert="horz" lIns="91440" tIns="45720" rIns="91440" bIns="45720" rtlCol="0" anchor="b">
+            <a:normAutofit fontScale="90000" lnSpcReduction="10000"/>
+          </a:bodyPr>
+          <a:lstStyle>
+            <a:lvl1pPr marL="0" algn="l" defTabSz="914400" rtl="0" eaLnBrk="1" latinLnBrk="0" hangingPunct="1">
+              <a:lnSpc>
+                <a:spcPct val="85000"/>
+              </a:lnSpc>
+              <a:spcBef>
+                <a:spcPct val="0"/>
+              </a:spcBef>
+              <a:buNone/>
+              <a:defRPr sz="4800" kern="1200" spc="-50" baseline="0">
+                <a:solidFill>
+                  <a:schemeClr val="tx1">
+                    <a:lumMod val="75000"/>
+                    <a:lumOff val="25000"/>
+                  </a:schemeClr>
+                </a:solidFill>
+                <a:latin typeface="+mj-lt"/>
+                <a:ea typeface="+mj-ea"/>
+                <a:cs typeface="+mj-cs"/>
+              </a:defRPr>
+            </a:lvl1pPr>
+          </a:lstStyle>
+          <a:p>
+            <a:r>
+              <a:rPr lang="en-US" smtClean="0"/>
               <a:t>Accuracy Comparison</a:t>
             </a:r>
             <a:endParaRPr lang="en-US" dirty="0"/>
@@ -22250,14 +21288,14 @@
           <p:nvPr>
             <p:extLst>
               <p:ext uri="{D42A27DB-BD31-4B8C-83A1-F6EECF244321}">
-                <p14:modId xmlns:p14="http://schemas.microsoft.com/office/powerpoint/2010/main" val="3659424176"/>
+                <p14:modId xmlns:p14="http://schemas.microsoft.com/office/powerpoint/2010/main" val="386785026"/>
               </p:ext>
             </p:extLst>
           </p:nvPr>
         </p:nvGraphicFramePr>
         <p:xfrm>
-          <a:off x="1097279" y="2230792"/>
-          <a:ext cx="9763377" cy="1411281"/>
+          <a:off x="629728" y="2139350"/>
+          <a:ext cx="10351698" cy="2597935"/>
         </p:xfrm>
         <a:graphic>
           <a:graphicData uri="http://schemas.openxmlformats.org/drawingml/2006/table">
@@ -22266,22 +21304,65 @@
                 <a:tableStyleId>{5C22544A-7EE6-4342-B048-85BDC9FD1C3A}</a:tableStyleId>
               </a:tblPr>
               <a:tblGrid>
-                <a:gridCol w="1440393"/>
-                <a:gridCol w="2061390"/>
-                <a:gridCol w="2148491"/>
-                <a:gridCol w="2051712"/>
-                <a:gridCol w="2061391"/>
+                <a:gridCol w="1262402"/>
+                <a:gridCol w="1748217"/>
+                <a:gridCol w="1751162"/>
+                <a:gridCol w="1871933"/>
+                <a:gridCol w="1811547"/>
+                <a:gridCol w="1906437"/>
               </a:tblGrid>
-              <a:tr h="771201">
+              <a:tr h="868612">
                 <a:tc>
                   <a:txBody>
                     <a:bodyPr/>
                     <a:lstStyle/>
                     <a:p>
+                      <a:pPr marL="0" marR="0" indent="0" algn="l" defTabSz="914400" rtl="0" eaLnBrk="1" fontAlgn="auto" latinLnBrk="0" hangingPunct="1">
+                        <a:lnSpc>
+                          <a:spcPct val="100000"/>
+                        </a:lnSpc>
+                        <a:spcBef>
+                          <a:spcPts val="0"/>
+                        </a:spcBef>
+                        <a:spcAft>
+                          <a:spcPts val="0"/>
+                        </a:spcAft>
+                        <a:buClrTx/>
+                        <a:buSzTx/>
+                        <a:buFontTx/>
+                        <a:buNone/>
+                        <a:tabLst/>
+                        <a:defRPr/>
+                      </a:pPr>
                       <a:r>
                         <a:rPr lang="en-US" dirty="0" smtClean="0"/>
-                        <a:t>seeds</a:t>
+                        <a:t>Hamming</a:t>
                       </a:r>
+                    </a:p>
+                    <a:p>
+                      <a:pPr marL="0" marR="0" indent="0" algn="l" defTabSz="914400" rtl="0" eaLnBrk="1" fontAlgn="auto" latinLnBrk="0" hangingPunct="1">
+                        <a:lnSpc>
+                          <a:spcPct val="100000"/>
+                        </a:lnSpc>
+                        <a:spcBef>
+                          <a:spcPts val="0"/>
+                        </a:spcBef>
+                        <a:spcAft>
+                          <a:spcPts val="0"/>
+                        </a:spcAft>
+                        <a:buClrTx/>
+                        <a:buSzTx/>
+                        <a:buFontTx/>
+                        <a:buNone/>
+                        <a:tabLst/>
+                        <a:defRPr/>
+                      </a:pPr>
+                      <a:r>
+                        <a:rPr lang="en-US" dirty="0" smtClean="0"/>
+                        <a:t>distance</a:t>
+                      </a:r>
+                    </a:p>
+                    <a:p>
                       <a:endParaRPr lang="en-US" dirty="0"/>
                     </a:p>
                   </a:txBody>
@@ -22313,7 +21394,6 @@
                         <a:rPr lang="en-US" dirty="0" smtClean="0"/>
                         <a:t>Single-Linkage</a:t>
                       </a:r>
-                      <a:endParaRPr lang="en-US" dirty="0" smtClean="0"/>
                     </a:p>
                   </a:txBody>
                   <a:tcPr/>
@@ -22427,13 +21507,10 @@
                         <a:rPr lang="en-US" dirty="0" smtClean="0"/>
                         <a:t>(k-means)</a:t>
                       </a:r>
-                      <a:endParaRPr lang="en-US" dirty="0" smtClean="0"/>
                     </a:p>
                   </a:txBody>
                   <a:tcPr/>
                 </a:tc>
-              </a:tr>
-              <a:tr h="458380">
                 <a:tc>
                   <a:txBody>
                     <a:bodyPr/>
@@ -22458,9 +21535,23 @@
                       </a:pPr>
                       <a:r>
                         <a:rPr lang="en-US" dirty="0" smtClean="0"/>
-                        <a:t>Hamming</a:t>
+                        <a:t>K-</a:t>
                       </a:r>
+                      <a:r>
+                        <a:rPr lang="en-US" dirty="0" err="1" smtClean="0"/>
+                        <a:t>Medoids</a:t>
+                      </a:r>
+                      <a:endParaRPr lang="en-US" dirty="0" smtClean="0"/>
                     </a:p>
+                  </a:txBody>
+                  <a:tcPr/>
+                </a:tc>
+              </a:tr>
+              <a:tr h="435427">
+                <a:tc>
+                  <a:txBody>
+                    <a:bodyPr/>
+                    <a:lstStyle/>
                     <a:p>
                       <a:pPr marL="0" marR="0" indent="0" algn="l" defTabSz="914400" rtl="0" eaLnBrk="1" fontAlgn="auto" latinLnBrk="0" hangingPunct="1">
                         <a:lnSpc>
@@ -22481,9 +21572,237 @@
                       </a:pPr>
                       <a:r>
                         <a:rPr lang="en-US" dirty="0" smtClean="0"/>
-                        <a:t>distance</a:t>
+                        <a:t>Iris</a:t>
                       </a:r>
                       <a:endParaRPr lang="en-US" dirty="0" smtClean="0"/>
+                    </a:p>
+                  </a:txBody>
+                  <a:tcPr/>
+                </a:tc>
+                <a:tc>
+                  <a:txBody>
+                    <a:bodyPr/>
+                    <a:lstStyle/>
+                    <a:p>
+                      <a:r>
+                        <a:rPr lang="en-US" dirty="0" smtClean="0"/>
+                        <a:t>0.32</a:t>
+                      </a:r>
+                      <a:endParaRPr lang="en-US" dirty="0"/>
+                    </a:p>
+                  </a:txBody>
+                  <a:tcPr/>
+                </a:tc>
+                <a:tc>
+                  <a:txBody>
+                    <a:bodyPr/>
+                    <a:lstStyle/>
+                    <a:p>
+                      <a:r>
+                        <a:rPr lang="en-US" dirty="0" smtClean="0"/>
+                        <a:t>0.16</a:t>
+                      </a:r>
+                      <a:endParaRPr lang="en-US" dirty="0"/>
+                    </a:p>
+                  </a:txBody>
+                  <a:tcPr/>
+                </a:tc>
+                <a:tc>
+                  <a:txBody>
+                    <a:bodyPr/>
+                    <a:lstStyle/>
+                    <a:p>
+                      <a:r>
+                        <a:rPr lang="en-US" dirty="0" smtClean="0">
+                          <a:solidFill>
+                            <a:srgbClr val="00B0F0"/>
+                          </a:solidFill>
+                        </a:rPr>
+                        <a:t>0.0933333333333</a:t>
+                      </a:r>
+                      <a:endParaRPr lang="en-US" dirty="0">
+                        <a:solidFill>
+                          <a:srgbClr val="00B0F0"/>
+                        </a:solidFill>
+                      </a:endParaRPr>
+                    </a:p>
+                  </a:txBody>
+                  <a:tcPr/>
+                </a:tc>
+                <a:tc>
+                  <a:txBody>
+                    <a:bodyPr/>
+                    <a:lstStyle/>
+                    <a:p>
+                      <a:r>
+                        <a:rPr lang="en-US" dirty="0" smtClean="0"/>
+                        <a:t>0.106666666667</a:t>
+                      </a:r>
+                      <a:endParaRPr lang="en-US" dirty="0"/>
+                    </a:p>
+                  </a:txBody>
+                  <a:tcPr/>
+                </a:tc>
+                <a:tc>
+                  <a:txBody>
+                    <a:bodyPr/>
+                    <a:lstStyle/>
+                    <a:p>
+                      <a:r>
+                        <a:rPr lang="en-US" dirty="0" smtClean="0"/>
+                        <a:t>0.106666666667</a:t>
+                      </a:r>
+                      <a:endParaRPr lang="en-US" dirty="0"/>
+                    </a:p>
+                  </a:txBody>
+                  <a:tcPr/>
+                </a:tc>
+              </a:tr>
+              <a:tr h="608028">
+                <a:tc>
+                  <a:txBody>
+                    <a:bodyPr/>
+                    <a:lstStyle/>
+                    <a:p>
+                      <a:pPr marL="0" marR="0" indent="0" algn="l" defTabSz="914400" rtl="0" eaLnBrk="1" fontAlgn="auto" latinLnBrk="0" hangingPunct="1">
+                        <a:lnSpc>
+                          <a:spcPct val="100000"/>
+                        </a:lnSpc>
+                        <a:spcBef>
+                          <a:spcPts val="0"/>
+                        </a:spcBef>
+                        <a:spcAft>
+                          <a:spcPts val="0"/>
+                        </a:spcAft>
+                        <a:buClrTx/>
+                        <a:buSzTx/>
+                        <a:buFontTx/>
+                        <a:buNone/>
+                        <a:tabLst/>
+                        <a:defRPr/>
+                      </a:pPr>
+                      <a:r>
+                        <a:rPr lang="en-US" dirty="0" smtClean="0"/>
+                        <a:t>User Knowledge</a:t>
+                      </a:r>
+                    </a:p>
+                  </a:txBody>
+                  <a:tcPr/>
+                </a:tc>
+                <a:tc>
+                  <a:txBody>
+                    <a:bodyPr/>
+                    <a:lstStyle/>
+                    <a:p>
+                      <a:r>
+                        <a:rPr lang="en-US" dirty="0" smtClean="0"/>
+                        <a:t>0.669975186104</a:t>
+                      </a:r>
+                      <a:endParaRPr lang="en-US" dirty="0"/>
+                    </a:p>
+                  </a:txBody>
+                  <a:tcPr/>
+                </a:tc>
+                <a:tc>
+                  <a:txBody>
+                    <a:bodyPr/>
+                    <a:lstStyle/>
+                    <a:p>
+                      <a:r>
+                        <a:rPr lang="en-US" dirty="0" smtClean="0">
+                          <a:solidFill>
+                            <a:schemeClr val="tx1"/>
+                          </a:solidFill>
+                        </a:rPr>
+                        <a:t>0.111662531017</a:t>
+                      </a:r>
+                      <a:endParaRPr lang="en-US" dirty="0">
+                        <a:solidFill>
+                          <a:schemeClr val="tx1"/>
+                        </a:solidFill>
+                      </a:endParaRPr>
+                    </a:p>
+                  </a:txBody>
+                  <a:tcPr/>
+                </a:tc>
+                <a:tc>
+                  <a:txBody>
+                    <a:bodyPr/>
+                    <a:lstStyle/>
+                    <a:p>
+                      <a:r>
+                        <a:rPr lang="en-US" dirty="0" smtClean="0"/>
+                        <a:t>0.543424317618</a:t>
+                      </a:r>
+                      <a:endParaRPr lang="en-US" dirty="0"/>
+                    </a:p>
+                  </a:txBody>
+                  <a:tcPr/>
+                </a:tc>
+                <a:tc>
+                  <a:txBody>
+                    <a:bodyPr/>
+                    <a:lstStyle/>
+                    <a:p>
+                      <a:r>
+                        <a:rPr lang="en-US" dirty="0" smtClean="0">
+                          <a:solidFill>
+                            <a:srgbClr val="00B0F0"/>
+                          </a:solidFill>
+                        </a:rPr>
+                        <a:t>0.104218362283</a:t>
+                      </a:r>
+                      <a:endParaRPr lang="en-US" dirty="0">
+                        <a:solidFill>
+                          <a:srgbClr val="00B0F0"/>
+                        </a:solidFill>
+                      </a:endParaRPr>
+                    </a:p>
+                  </a:txBody>
+                  <a:tcPr/>
+                </a:tc>
+                <a:tc>
+                  <a:txBody>
+                    <a:bodyPr/>
+                    <a:lstStyle/>
+                    <a:p>
+                      <a:r>
+                        <a:rPr lang="en-US" dirty="0" smtClean="0"/>
+                        <a:t>0.151364764268</a:t>
+                      </a:r>
+                      <a:endParaRPr lang="en-US" dirty="0"/>
+                    </a:p>
+                  </a:txBody>
+                  <a:tcPr/>
+                </a:tc>
+              </a:tr>
+              <a:tr h="608028">
+                <a:tc>
+                  <a:txBody>
+                    <a:bodyPr/>
+                    <a:lstStyle/>
+                    <a:p>
+                      <a:pPr marL="0" marR="0" indent="0" algn="l" defTabSz="914400" rtl="0" eaLnBrk="1" fontAlgn="auto" latinLnBrk="0" hangingPunct="1">
+                        <a:lnSpc>
+                          <a:spcPct val="100000"/>
+                        </a:lnSpc>
+                        <a:spcBef>
+                          <a:spcPts val="0"/>
+                        </a:spcBef>
+                        <a:spcAft>
+                          <a:spcPts val="0"/>
+                        </a:spcAft>
+                        <a:buClrTx/>
+                        <a:buSzTx/>
+                        <a:buFontTx/>
+                        <a:buNone/>
+                        <a:tabLst/>
+                        <a:defRPr/>
+                      </a:pPr>
+                      <a:r>
+                        <a:rPr lang="en-US" dirty="0" smtClean="0"/>
+                        <a:t>seeds</a:t>
+                      </a:r>
                     </a:p>
                   </a:txBody>
                   <a:tcPr/>
@@ -22522,8 +21841,30 @@
                     <a:lstStyle/>
                     <a:p>
                       <a:r>
+                        <a:rPr lang="en-US" dirty="0" smtClean="0">
+                          <a:solidFill>
+                            <a:srgbClr val="00B0F0"/>
+                          </a:solidFill>
+                        </a:rPr>
+                        <a:t>0.0904761904762</a:t>
+                      </a:r>
+                      <a:endParaRPr lang="en-US" dirty="0">
+                        <a:solidFill>
+                          <a:srgbClr val="00B0F0"/>
+                        </a:solidFill>
+                      </a:endParaRPr>
+                    </a:p>
+                  </a:txBody>
+                  <a:tcPr/>
+                </a:tc>
+                <a:tc>
+                  <a:txBody>
+                    <a:bodyPr/>
+                    <a:lstStyle/>
+                    <a:p>
+                      <a:r>
                         <a:rPr lang="en-US" dirty="0" smtClean="0"/>
-                        <a:t>0.0904761904762</a:t>
+                        <a:t>0.104761904762</a:t>
                       </a:r>
                       <a:endParaRPr lang="en-US" dirty="0"/>
                     </a:p>
@@ -22537,7 +21878,7 @@
                     <a:p>
                       <a:r>
                         <a:rPr lang="en-US" dirty="0" smtClean="0"/>
-                        <a:t>0.109523809524</a:t>
+                        <a:t>0.252380952381</a:t>
                       </a:r>
                       <a:endParaRPr lang="en-US" dirty="0"/>
                     </a:p>
@@ -22549,74 +21890,27 @@
           </a:graphicData>
         </a:graphic>
       </p:graphicFrame>
-      <p:sp>
-        <p:nvSpPr>
-          <p:cNvPr id="5" name="内容占位符 2"/>
-          <p:cNvSpPr>
-            <a:spLocks noGrp="1"/>
-          </p:cNvSpPr>
-          <p:nvPr>
-            <p:ph idx="1"/>
-          </p:nvPr>
-        </p:nvSpPr>
-        <p:spPr>
-          <a:xfrm>
-            <a:off x="1010728" y="4563374"/>
-            <a:ext cx="9401355" cy="862642"/>
-          </a:xfrm>
-        </p:spPr>
-        <p:txBody>
-          <a:bodyPr>
-            <a:normAutofit/>
-          </a:bodyPr>
-          <a:lstStyle/>
-          <a:p>
-            <a:pPr marL="0" indent="0">
-              <a:buNone/>
-            </a:pPr>
-            <a:r>
-              <a:rPr lang="en-US" dirty="0"/>
-              <a:t> </a:t>
-            </a:r>
-            <a:r>
-              <a:rPr lang="en-US" dirty="0" smtClean="0"/>
-              <a:t>Single-Linkage </a:t>
-            </a:r>
-            <a:r>
-              <a:rPr lang="en-US" dirty="0" smtClean="0"/>
-              <a:t>is</a:t>
-            </a:r>
-            <a:r>
-              <a:rPr lang="en-US" dirty="0" smtClean="0"/>
-              <a:t> not good for this data set</a:t>
-            </a:r>
-          </a:p>
-          <a:p>
-            <a:pPr marL="0" indent="0">
-              <a:buNone/>
-            </a:pPr>
-            <a:r>
-              <a:rPr lang="en-US" dirty="0" smtClean="0"/>
-              <a:t>For this data set, the Average-linkage works best.</a:t>
-            </a:r>
-            <a:endParaRPr lang="en-US" dirty="0" smtClean="0"/>
-          </a:p>
-        </p:txBody>
-      </p:sp>
     </p:spTree>
     <p:extLst>
       <p:ext uri="{BB962C8B-B14F-4D97-AF65-F5344CB8AC3E}">
-        <p14:creationId xmlns:p14="http://schemas.microsoft.com/office/powerpoint/2010/main" val="3612916998"/>
+        <p14:creationId xmlns:p14="http://schemas.microsoft.com/office/powerpoint/2010/main" val="3999078308"/>
       </p:ext>
     </p:extLst>
   </p:cSld>
   <p:clrMapOvr>
     <a:masterClrMapping/>
   </p:clrMapOvr>
+  <p:timing>
+    <p:tnLst>
+      <p:par>
+        <p:cTn id="1" dur="indefinite" restart="never" nodeType="tmRoot"/>
+      </p:par>
+    </p:tnLst>
+  </p:timing>
 </p:sld>
 </file>
 
-<file path=ppt/slides/slide9.xml><?xml version="1.0" encoding="utf-8"?>
+<file path=ppt/slides/slide7.xml><?xml version="1.0" encoding="utf-8"?>
 <p:sld xmlns:a="http://schemas.openxmlformats.org/drawingml/2006/main" xmlns:r="http://schemas.openxmlformats.org/officeDocument/2006/relationships" xmlns:p="http://schemas.openxmlformats.org/presentationml/2006/main">
   <p:cSld>
     <p:spTree>
@@ -22708,6 +22002,72 @@
   <p:clrMapOvr>
     <a:masterClrMapping/>
   </p:clrMapOvr>
+</p:sld>
+</file>
+
+<file path=ppt/slides/slide8.xml><?xml version="1.0" encoding="utf-8"?>
+<p:sld xmlns:a="http://schemas.openxmlformats.org/drawingml/2006/main" xmlns:r="http://schemas.openxmlformats.org/officeDocument/2006/relationships" xmlns:p="http://schemas.openxmlformats.org/presentationml/2006/main">
+  <p:cSld>
+    <p:spTree>
+      <p:nvGrpSpPr>
+        <p:cNvPr id="1" name=""/>
+        <p:cNvGrpSpPr/>
+        <p:nvPr/>
+      </p:nvGrpSpPr>
+      <p:grpSpPr>
+        <a:xfrm>
+          <a:off x="0" y="0"/>
+          <a:ext cx="0" cy="0"/>
+          <a:chOff x="0" y="0"/>
+          <a:chExt cx="0" cy="0"/>
+        </a:xfrm>
+      </p:grpSpPr>
+      <p:sp>
+        <p:nvSpPr>
+          <p:cNvPr id="2" name="标题 1"/>
+          <p:cNvSpPr>
+            <a:spLocks noGrp="1"/>
+          </p:cNvSpPr>
+          <p:nvPr>
+            <p:ph type="title"/>
+          </p:nvPr>
+        </p:nvSpPr>
+        <p:spPr>
+          <a:xfrm>
+            <a:off x="1174917" y="2141282"/>
+            <a:ext cx="10058400" cy="1450757"/>
+          </a:xfrm>
+        </p:spPr>
+        <p:txBody>
+          <a:bodyPr/>
+          <a:lstStyle/>
+          <a:p>
+            <a:pPr algn="ctr"/>
+            <a:r>
+              <a:rPr lang="en-US" dirty="0" smtClean="0"/>
+              <a:t>Thank you!</a:t>
+            </a:r>
+            <a:endParaRPr lang="en-US" dirty="0"/>
+          </a:p>
+        </p:txBody>
+      </p:sp>
+    </p:spTree>
+    <p:extLst>
+      <p:ext uri="{BB962C8B-B14F-4D97-AF65-F5344CB8AC3E}">
+        <p14:creationId xmlns:p14="http://schemas.microsoft.com/office/powerpoint/2010/main" val="2297984777"/>
+      </p:ext>
+    </p:extLst>
+  </p:cSld>
+  <p:clrMapOvr>
+    <a:masterClrMapping/>
+  </p:clrMapOvr>
+  <p:timing>
+    <p:tnLst>
+      <p:par>
+        <p:cTn id="1" dur="indefinite" restart="never" nodeType="tmRoot"/>
+      </p:par>
+    </p:tnLst>
+  </p:timing>
 </p:sld>
 </file>
 

</xml_diff>